<commit_message>
11 commit. Se corrigieron algunos errores de ortografia.
</commit_message>
<xml_diff>
--- a/TF_SIMULACION_PRESENTACION.pptx
+++ b/TF_SIMULACION_PRESENTACION.pptx
@@ -254,6 +254,7 @@
 
 <file path=ppt/charts/chart1.xml><?xml version="1.0" encoding="utf-8"?>
 <c:chartSpace xmlns:c="http://schemas.openxmlformats.org/drawingml/2006/chart" xmlns:a="http://schemas.openxmlformats.org/drawingml/2006/main" xmlns:r="http://schemas.openxmlformats.org/officeDocument/2006/relationships">
+  <c:date1904 val="1"/>
   <c:lang val="es-AR"/>
   <c:chart>
     <c:title>
@@ -300,45 +301,45 @@
                 <c:formatCode>0.000</c:formatCode>
                 <c:ptCount val="10"/>
                 <c:pt idx="0">
-                  <c:v>5.6000000000000001E-2</c:v>
+                  <c:v>5.6000000000000008E-2</c:v>
                 </c:pt>
                 <c:pt idx="1">
-                  <c:v>0.10199999999999999</c:v>
+                  <c:v>0.10199999999999998</c:v>
                 </c:pt>
                 <c:pt idx="2">
-                  <c:v>0.154</c:v>
+                  <c:v>0.15400000000000003</c:v>
                 </c:pt>
                 <c:pt idx="3">
-                  <c:v>0.191</c:v>
+                  <c:v>0.19100000000000003</c:v>
                 </c:pt>
                 <c:pt idx="4">
-                  <c:v>0.214</c:v>
+                  <c:v>0.21400000000000002</c:v>
                 </c:pt>
                 <c:pt idx="5">
-                  <c:v>0.214</c:v>
+                  <c:v>0.21400000000000002</c:v>
                 </c:pt>
                 <c:pt idx="6">
-                  <c:v>0.215</c:v>
+                  <c:v>0.21500000000000002</c:v>
                 </c:pt>
                 <c:pt idx="7">
-                  <c:v>0.22</c:v>
+                  <c:v>0.22000000000000003</c:v>
                 </c:pt>
                 <c:pt idx="8">
-                  <c:v>0.214</c:v>
+                  <c:v>0.21400000000000002</c:v>
                 </c:pt>
                 <c:pt idx="9">
-                  <c:v>0.22500000000000001</c:v>
+                  <c:v>0.22500000000000003</c:v>
                 </c:pt>
               </c:numCache>
             </c:numRef>
           </c:val>
         </c:ser>
         <c:marker val="1"/>
-        <c:axId val="90527616"/>
-        <c:axId val="93788416"/>
+        <c:axId val="66156800"/>
+        <c:axId val="66179456"/>
       </c:lineChart>
       <c:catAx>
-        <c:axId val="90527616"/>
+        <c:axId val="66156800"/>
         <c:scaling>
           <c:orientation val="minMax"/>
         </c:scaling>
@@ -353,7 +354,7 @@
                   <a:defRPr sz="800"/>
                 </a:pPr>
                 <a:r>
-                  <a:rPr lang="es-AR" sz="800"/>
+                  <a:rPr lang="es-AR" sz="800" dirty="0"/>
                   <a:t>cantidad de enlaces</a:t>
                 </a:r>
               </a:p>
@@ -372,14 +373,14 @@
             <a:endParaRPr lang="es-AR"/>
           </a:p>
         </c:txPr>
-        <c:crossAx val="93788416"/>
+        <c:crossAx val="66179456"/>
         <c:crosses val="autoZero"/>
         <c:auto val="1"/>
         <c:lblAlgn val="ctr"/>
         <c:lblOffset val="100"/>
       </c:catAx>
       <c:valAx>
-        <c:axId val="93788416"/>
+        <c:axId val="66179456"/>
         <c:scaling>
           <c:orientation val="minMax"/>
           <c:max val="1"/>
@@ -397,14 +398,14 @@
                   <a:defRPr sz="800"/>
                 </a:pPr>
                 <a:r>
-                  <a:rPr lang="es-AR" sz="800"/>
+                  <a:rPr lang="es-AR" sz="800" dirty="0"/>
                   <a:t>Proporción</a:t>
                 </a:r>
                 <a:r>
-                  <a:rPr lang="es-AR" sz="800" baseline="0"/>
+                  <a:rPr lang="es-AR" sz="800" baseline="0" dirty="0"/>
                   <a:t> exitosas</a:t>
                 </a:r>
-                <a:endParaRPr lang="es-AR" sz="800"/>
+                <a:endParaRPr lang="es-AR" sz="800" dirty="0"/>
               </a:p>
             </c:rich>
           </c:tx>
@@ -422,7 +423,7 @@
             <a:endParaRPr lang="es-AR"/>
           </a:p>
         </c:txPr>
-        <c:crossAx val="90527616"/>
+        <c:crossAx val="66156800"/>
         <c:crosses val="autoZero"/>
         <c:crossBetween val="between"/>
       </c:valAx>
@@ -481,16 +482,16 @@
                 <c:formatCode>0.000</c:formatCode>
                 <c:ptCount val="10"/>
                 <c:pt idx="0">
-                  <c:v>5.4999999999999993E-2</c:v>
+                  <c:v>5.5E-2</c:v>
                 </c:pt>
                 <c:pt idx="1">
-                  <c:v>0.108</c:v>
+                  <c:v>0.10800000000000001</c:v>
                 </c:pt>
                 <c:pt idx="2">
-                  <c:v>0.15333333333333332</c:v>
+                  <c:v>0.15333333333333338</c:v>
                 </c:pt>
                 <c:pt idx="3">
-                  <c:v>0.20433333333333334</c:v>
+                  <c:v>0.20433333333333337</c:v>
                 </c:pt>
                 <c:pt idx="4">
                   <c:v>0.25700000000000001</c:v>
@@ -499,13 +500,13 @@
                   <c:v>0.29933333333333328</c:v>
                 </c:pt>
                 <c:pt idx="6">
-                  <c:v>0.36800000000000005</c:v>
+                  <c:v>0.3680000000000001</c:v>
                 </c:pt>
                 <c:pt idx="7">
-                  <c:v>0.41033333333333338</c:v>
+                  <c:v>0.41033333333333333</c:v>
                 </c:pt>
                 <c:pt idx="8">
-                  <c:v>0.4443333333333333</c:v>
+                  <c:v>0.44433333333333325</c:v>
                 </c:pt>
                 <c:pt idx="9">
                   <c:v>0.49133333333333334</c:v>
@@ -515,11 +516,11 @@
           </c:val>
         </c:ser>
         <c:marker val="1"/>
-        <c:axId val="123400960"/>
-        <c:axId val="123408384"/>
+        <c:axId val="66220032"/>
+        <c:axId val="66221952"/>
       </c:lineChart>
       <c:catAx>
-        <c:axId val="123400960"/>
+        <c:axId val="66220032"/>
         <c:scaling>
           <c:orientation val="minMax"/>
         </c:scaling>
@@ -534,7 +535,7 @@
                   <a:defRPr sz="800"/>
                 </a:pPr>
                 <a:r>
-                  <a:rPr lang="es-AR" sz="800"/>
+                  <a:rPr lang="es-AR" sz="800" dirty="0"/>
                   <a:t>cantidad de enlaces</a:t>
                 </a:r>
               </a:p>
@@ -553,14 +554,14 @@
             <a:endParaRPr lang="es-AR"/>
           </a:p>
         </c:txPr>
-        <c:crossAx val="123408384"/>
+        <c:crossAx val="66221952"/>
         <c:crosses val="autoZero"/>
         <c:auto val="1"/>
         <c:lblAlgn val="ctr"/>
         <c:lblOffset val="100"/>
       </c:catAx>
       <c:valAx>
-        <c:axId val="123408384"/>
+        <c:axId val="66221952"/>
         <c:scaling>
           <c:orientation val="minMax"/>
           <c:max val="1"/>
@@ -578,14 +579,14 @@
                   <a:defRPr sz="800"/>
                 </a:pPr>
                 <a:r>
-                  <a:rPr lang="es-AR" sz="800"/>
+                  <a:rPr lang="es-AR" sz="800" dirty="0"/>
                   <a:t>Proporción</a:t>
                 </a:r>
                 <a:r>
-                  <a:rPr lang="es-AR" sz="800" baseline="0"/>
+                  <a:rPr lang="es-AR" sz="800" baseline="0" dirty="0"/>
                   <a:t> exitosas</a:t>
                 </a:r>
-                <a:endParaRPr lang="es-AR" sz="800"/>
+                <a:endParaRPr lang="es-AR" sz="800" dirty="0"/>
               </a:p>
             </c:rich>
           </c:tx>
@@ -603,7 +604,7 @@
             <a:endParaRPr lang="es-AR"/>
           </a:p>
         </c:txPr>
-        <c:crossAx val="123400960"/>
+        <c:crossAx val="66220032"/>
         <c:crosses val="autoZero"/>
         <c:crossBetween val="between"/>
       </c:valAx>
@@ -616,6 +617,7 @@
 
 <file path=ppt/charts/chart3.xml><?xml version="1.0" encoding="utf-8"?>
 <c:chartSpace xmlns:c="http://schemas.openxmlformats.org/drawingml/2006/chart" xmlns:a="http://schemas.openxmlformats.org/drawingml/2006/main" xmlns:r="http://schemas.openxmlformats.org/officeDocument/2006/relationships">
+  <c:date1904 val="1"/>
   <c:lang val="es-AR"/>
   <c:chart>
     <c:title>
@@ -628,14 +630,18 @@
               <a:defRPr sz="1200"/>
             </a:pPr>
             <a:r>
-              <a:rPr lang="es-AR" sz="1200"/>
-              <a:t>Proporcion</a:t>
+              <a:rPr lang="es-AR" sz="1200" dirty="0" smtClean="0"/>
+              <a:t>Proporción</a:t>
             </a:r>
             <a:r>
-              <a:rPr lang="es-AR" sz="1200" baseline="0"/>
-              <a:t> por variación de cantidad teléfonos</a:t>
+              <a:rPr lang="es-AR" sz="1200" baseline="0" dirty="0" smtClean="0"/>
+              <a:t> </a:t>
             </a:r>
-            <a:endParaRPr lang="es-AR" sz="1200"/>
+            <a:r>
+              <a:rPr lang="es-AR" sz="1200" baseline="0" dirty="0"/>
+              <a:t>por variación de cantidad teléfonos</a:t>
+            </a:r>
+            <a:endParaRPr lang="es-AR" sz="1200" dirty="0"/>
           </a:p>
         </c:rich>
       </c:tx>
@@ -736,40 +742,40 @@
                 <c:formatCode>General</c:formatCode>
                 <c:ptCount val="23"/>
                 <c:pt idx="0">
-                  <c:v>9.8000000000000018E-2</c:v>
+                  <c:v>9.8000000000000032E-2</c:v>
                 </c:pt>
                 <c:pt idx="1">
-                  <c:v>0.10766666666666667</c:v>
+                  <c:v>0.10766666666666669</c:v>
                 </c:pt>
                 <c:pt idx="2">
                   <c:v>0.10133333333333333</c:v>
                 </c:pt>
                 <c:pt idx="3">
-                  <c:v>0.105</c:v>
+                  <c:v>0.10500000000000001</c:v>
                 </c:pt>
                 <c:pt idx="4">
-                  <c:v>0.106</c:v>
+                  <c:v>0.10600000000000001</c:v>
                 </c:pt>
                 <c:pt idx="5">
                   <c:v>0.10133333333333333</c:v>
                 </c:pt>
                 <c:pt idx="6">
-                  <c:v>0.10199999999999999</c:v>
+                  <c:v>0.10199999999999998</c:v>
                 </c:pt>
                 <c:pt idx="7">
                   <c:v>0.10000000000000002</c:v>
                 </c:pt>
                 <c:pt idx="8">
-                  <c:v>0.10366666666666667</c:v>
+                  <c:v>0.10366666666666668</c:v>
                 </c:pt>
                 <c:pt idx="9">
-                  <c:v>9.9000000000000019E-2</c:v>
+                  <c:v>9.9000000000000046E-2</c:v>
                 </c:pt>
                 <c:pt idx="10">
                   <c:v>0.11</c:v>
                 </c:pt>
                 <c:pt idx="11">
-                  <c:v>0.10833333333333334</c:v>
+                  <c:v>0.10833333333333335</c:v>
                 </c:pt>
                 <c:pt idx="12">
                   <c:v>0.10333333333333333</c:v>
@@ -778,42 +784,42 @@
                   <c:v>0.10233333333333333</c:v>
                 </c:pt>
                 <c:pt idx="14">
-                  <c:v>0.10766666666666667</c:v>
+                  <c:v>0.10766666666666669</c:v>
                 </c:pt>
                 <c:pt idx="15">
-                  <c:v>0.10266666666666668</c:v>
+                  <c:v>0.1026666666666667</c:v>
                 </c:pt>
                 <c:pt idx="16">
                   <c:v>0.10433333333333333</c:v>
                 </c:pt>
                 <c:pt idx="17">
-                  <c:v>0.10766666666666667</c:v>
+                  <c:v>0.10766666666666669</c:v>
                 </c:pt>
                 <c:pt idx="18">
-                  <c:v>0.10866666666666668</c:v>
+                  <c:v>0.1086666666666667</c:v>
                 </c:pt>
                 <c:pt idx="19">
-                  <c:v>0.10566666666666667</c:v>
+                  <c:v>0.10566666666666669</c:v>
                 </c:pt>
                 <c:pt idx="20">
-                  <c:v>0.106</c:v>
+                  <c:v>0.10600000000000001</c:v>
                 </c:pt>
                 <c:pt idx="21">
-                  <c:v>0.108</c:v>
+                  <c:v>0.10800000000000001</c:v>
                 </c:pt>
                 <c:pt idx="22">
-                  <c:v>0.10933333333333334</c:v>
+                  <c:v>0.10933333333333335</c:v>
                 </c:pt>
               </c:numCache>
             </c:numRef>
           </c:val>
         </c:ser>
         <c:marker val="1"/>
-        <c:axId val="72460160"/>
-        <c:axId val="72471296"/>
+        <c:axId val="66252160"/>
+        <c:axId val="66885120"/>
       </c:lineChart>
       <c:catAx>
-        <c:axId val="72460160"/>
+        <c:axId val="66252160"/>
         <c:scaling>
           <c:orientation val="minMax"/>
         </c:scaling>
@@ -828,7 +834,7 @@
                   <a:defRPr sz="800"/>
                 </a:pPr>
                 <a:r>
-                  <a:rPr lang="es-AR" sz="800"/>
+                  <a:rPr lang="es-AR" sz="800" dirty="0"/>
                   <a:t>cantidad de teléfonos</a:t>
                 </a:r>
               </a:p>
@@ -848,14 +854,14 @@
             <a:endParaRPr lang="es-AR"/>
           </a:p>
         </c:txPr>
-        <c:crossAx val="72471296"/>
+        <c:crossAx val="66885120"/>
         <c:crosses val="autoZero"/>
         <c:auto val="1"/>
         <c:lblAlgn val="ctr"/>
         <c:lblOffset val="100"/>
       </c:catAx>
       <c:valAx>
-        <c:axId val="72471296"/>
+        <c:axId val="66885120"/>
         <c:scaling>
           <c:orientation val="minMax"/>
           <c:max val="1"/>
@@ -873,14 +879,14 @@
                   <a:defRPr sz="800"/>
                 </a:pPr>
                 <a:r>
-                  <a:rPr lang="es-AR" sz="800"/>
+                  <a:rPr lang="es-AR" sz="800" dirty="0"/>
                   <a:t>Proporción</a:t>
                 </a:r>
                 <a:r>
-                  <a:rPr lang="es-AR" sz="800" baseline="0"/>
+                  <a:rPr lang="es-AR" sz="800" baseline="0" dirty="0"/>
                   <a:t> exitosas</a:t>
                 </a:r>
-                <a:endParaRPr lang="es-AR" sz="800"/>
+                <a:endParaRPr lang="es-AR" sz="800" dirty="0"/>
               </a:p>
             </c:rich>
           </c:tx>
@@ -898,7 +904,7 @@
             <a:endParaRPr lang="es-AR"/>
           </a:p>
         </c:txPr>
-        <c:crossAx val="72460160"/>
+        <c:crossAx val="66252160"/>
         <c:crosses val="autoZero"/>
         <c:crossBetween val="between"/>
       </c:valAx>
@@ -923,14 +929,18 @@
               <a:defRPr sz="1200"/>
             </a:pPr>
             <a:r>
-              <a:rPr lang="es-AR" sz="1200"/>
-              <a:t>Proporcion</a:t>
+              <a:rPr lang="es-AR" sz="1200" dirty="0" smtClean="0"/>
+              <a:t>Proporción</a:t>
             </a:r>
             <a:r>
-              <a:rPr lang="es-AR" sz="1200" baseline="0"/>
-              <a:t> por variación de cantidad teléfonos</a:t>
+              <a:rPr lang="es-AR" sz="1200" baseline="0" dirty="0" smtClean="0"/>
+              <a:t> </a:t>
             </a:r>
-            <a:endParaRPr lang="es-AR" sz="1200"/>
+            <a:r>
+              <a:rPr lang="es-AR" sz="1200" baseline="0" dirty="0"/>
+              <a:t>por variación de cantidad teléfonos</a:t>
+            </a:r>
+            <a:endParaRPr lang="es-AR" sz="1200" dirty="0"/>
           </a:p>
         </c:rich>
       </c:tx>
@@ -1013,22 +1023,22 @@
                 <c:formatCode>General</c:formatCode>
                 <c:ptCount val="17"/>
                 <c:pt idx="0">
-                  <c:v>9.8000000000000018E-2</c:v>
+                  <c:v>9.8000000000000032E-2</c:v>
                 </c:pt>
                 <c:pt idx="1">
-                  <c:v>0.14500000000000002</c:v>
+                  <c:v>0.14500000000000005</c:v>
                 </c:pt>
                 <c:pt idx="2">
                   <c:v>0.17966666666666664</c:v>
                 </c:pt>
                 <c:pt idx="3">
-                  <c:v>0.21366666666666667</c:v>
+                  <c:v>0.2136666666666667</c:v>
                 </c:pt>
                 <c:pt idx="4">
-                  <c:v>0.25033333333333335</c:v>
+                  <c:v>0.2503333333333333</c:v>
                 </c:pt>
                 <c:pt idx="5">
-                  <c:v>0.29099999999999998</c:v>
+                  <c:v>0.29100000000000004</c:v>
                 </c:pt>
                 <c:pt idx="6">
                   <c:v>0.39233333333333337</c:v>
@@ -1037,22 +1047,22 @@
                   <c:v>0.41933333333333334</c:v>
                 </c:pt>
                 <c:pt idx="8">
-                  <c:v>0.44366666666666665</c:v>
+                  <c:v>0.44366666666666671</c:v>
                 </c:pt>
                 <c:pt idx="9">
-                  <c:v>0.45133333333333336</c:v>
+                  <c:v>0.45133333333333331</c:v>
                 </c:pt>
                 <c:pt idx="10">
-                  <c:v>0.47599999999999998</c:v>
+                  <c:v>0.47600000000000003</c:v>
                 </c:pt>
                 <c:pt idx="11">
                   <c:v>0.47833333333333333</c:v>
                 </c:pt>
                 <c:pt idx="12">
-                  <c:v>0.48299999999999993</c:v>
+                  <c:v>0.48300000000000004</c:v>
                 </c:pt>
                 <c:pt idx="13">
-                  <c:v>0.47899999999999993</c:v>
+                  <c:v>0.47900000000000004</c:v>
                 </c:pt>
                 <c:pt idx="14">
                   <c:v>0.48633333333333334</c:v>
@@ -1061,18 +1071,18 @@
                   <c:v>0.49133333333333334</c:v>
                 </c:pt>
                 <c:pt idx="16">
-                  <c:v>0.50266666666666671</c:v>
+                  <c:v>0.5026666666666666</c:v>
                 </c:pt>
               </c:numCache>
             </c:numRef>
           </c:val>
         </c:ser>
         <c:marker val="1"/>
-        <c:axId val="73116672"/>
-        <c:axId val="73263744"/>
+        <c:axId val="66924928"/>
+        <c:axId val="66926848"/>
       </c:lineChart>
       <c:catAx>
-        <c:axId val="73116672"/>
+        <c:axId val="66924928"/>
         <c:scaling>
           <c:orientation val="minMax"/>
         </c:scaling>
@@ -1087,7 +1097,7 @@
                   <a:defRPr sz="800"/>
                 </a:pPr>
                 <a:r>
-                  <a:rPr lang="es-AR" sz="800"/>
+                  <a:rPr lang="es-AR" sz="800" dirty="0"/>
                   <a:t>cantidad de teléfonos</a:t>
                 </a:r>
               </a:p>
@@ -1107,14 +1117,14 @@
             <a:endParaRPr lang="es-AR"/>
           </a:p>
         </c:txPr>
-        <c:crossAx val="73263744"/>
+        <c:crossAx val="66926848"/>
         <c:crosses val="autoZero"/>
         <c:auto val="1"/>
         <c:lblAlgn val="ctr"/>
         <c:lblOffset val="100"/>
       </c:catAx>
       <c:valAx>
-        <c:axId val="73263744"/>
+        <c:axId val="66926848"/>
         <c:scaling>
           <c:orientation val="minMax"/>
           <c:max val="1"/>
@@ -1132,14 +1142,14 @@
                   <a:defRPr sz="800"/>
                 </a:pPr>
                 <a:r>
-                  <a:rPr lang="es-AR" sz="800"/>
+                  <a:rPr lang="es-AR" sz="800" dirty="0"/>
                   <a:t>Proporción</a:t>
                 </a:r>
                 <a:r>
-                  <a:rPr lang="es-AR" sz="800" baseline="0"/>
+                  <a:rPr lang="es-AR" sz="800" baseline="0" dirty="0"/>
                   <a:t> exitosas</a:t>
                 </a:r>
-                <a:endParaRPr lang="es-AR" sz="800"/>
+                <a:endParaRPr lang="es-AR" sz="800" dirty="0"/>
               </a:p>
             </c:rich>
           </c:tx>
@@ -1157,7 +1167,7 @@
             <a:endParaRPr lang="es-AR"/>
           </a:p>
         </c:txPr>
-        <c:crossAx val="73116672"/>
+        <c:crossAx val="66924928"/>
         <c:crosses val="autoZero"/>
         <c:crossBetween val="between"/>
       </c:valAx>
@@ -1289,7 +1299,7 @@
     </p:spTree>
     <p:extLst>
       <p:ext uri="{BB962C8B-B14F-4D97-AF65-F5344CB8AC3E}">
-        <p14:creationId xmlns="" xmlns:p14="http://schemas.microsoft.com/office/powerpoint/2010/main" val="83359290"/>
+        <p14:creationId xmlns:p14="http://schemas.microsoft.com/office/powerpoint/2010/main" xmlns="" val="83359290"/>
       </p:ext>
     </p:extLst>
   </p:cSld>
@@ -1472,7 +1482,7 @@
           </a:bodyPr>
           <a:lstStyle/>
           <a:p>
-            <a:endParaRPr/>
+            <a:endParaRPr dirty="0"/>
           </a:p>
         </p:txBody>
       </p:sp>
@@ -1567,7 +1577,7 @@
           </a:bodyPr>
           <a:lstStyle/>
           <a:p>
-            <a:endParaRPr/>
+            <a:endParaRPr dirty="0"/>
           </a:p>
         </p:txBody>
       </p:sp>
@@ -1766,7 +1776,12 @@
             <p:ph type="sldImg"/>
           </p:nvPr>
         </p:nvSpPr>
-        <p:spPr/>
+        <p:spPr>
+          <a:xfrm>
+            <a:off x="381000" y="685800"/>
+            <a:ext cx="6096000" cy="3429000"/>
+          </a:xfrm>
+        </p:spPr>
       </p:sp>
       <p:sp>
         <p:nvSpPr>
@@ -1910,7 +1925,7 @@
           </a:bodyPr>
           <a:lstStyle/>
           <a:p>
-            <a:endParaRPr/>
+            <a:endParaRPr dirty="0"/>
           </a:p>
         </p:txBody>
       </p:sp>
@@ -2005,7 +2020,7 @@
           </a:bodyPr>
           <a:lstStyle/>
           <a:p>
-            <a:endParaRPr/>
+            <a:endParaRPr dirty="0"/>
           </a:p>
         </p:txBody>
       </p:sp>
@@ -2100,7 +2115,7 @@
           </a:bodyPr>
           <a:lstStyle/>
           <a:p>
-            <a:endParaRPr/>
+            <a:endParaRPr dirty="0"/>
           </a:p>
         </p:txBody>
       </p:sp>
@@ -2195,7 +2210,7 @@
           </a:bodyPr>
           <a:lstStyle/>
           <a:p>
-            <a:endParaRPr/>
+            <a:endParaRPr dirty="0"/>
           </a:p>
         </p:txBody>
       </p:sp>
@@ -2290,7 +2305,7 @@
           </a:bodyPr>
           <a:lstStyle/>
           <a:p>
-            <a:endParaRPr/>
+            <a:endParaRPr dirty="0"/>
           </a:p>
         </p:txBody>
       </p:sp>
@@ -2801,7 +2816,7 @@
           </a:bodyPr>
           <a:lstStyle/>
           <a:p>
-            <a:endParaRPr/>
+            <a:endParaRPr dirty="0"/>
           </a:p>
         </p:txBody>
       </p:sp>
@@ -3687,7 +3702,7 @@
     </p:spTree>
     <p:extLst>
       <p:ext uri="{BB962C8B-B14F-4D97-AF65-F5344CB8AC3E}">
-        <p14:creationId xmlns="" xmlns:p14="http://schemas.microsoft.com/office/powerpoint/2010/main" val="2875832408"/>
+        <p14:creationId xmlns:p14="http://schemas.microsoft.com/office/powerpoint/2010/main" xmlns="" val="2875832408"/>
       </p:ext>
     </p:extLst>
   </p:cSld>
@@ -3780,7 +3795,7 @@
           </a:bodyPr>
           <a:lstStyle/>
           <a:p>
-            <a:endParaRPr/>
+            <a:endParaRPr dirty="0"/>
           </a:p>
         </p:txBody>
       </p:sp>
@@ -3852,7 +3867,7 @@
     </p:spTree>
     <p:extLst>
       <p:ext uri="{BB962C8B-B14F-4D97-AF65-F5344CB8AC3E}">
-        <p14:creationId xmlns="" xmlns:p14="http://schemas.microsoft.com/office/powerpoint/2010/main" val="1085717763"/>
+        <p14:creationId xmlns:p14="http://schemas.microsoft.com/office/powerpoint/2010/main" xmlns="" val="1085717763"/>
       </p:ext>
     </p:extLst>
   </p:cSld>
@@ -3918,7 +3933,7 @@
     </p:spTree>
     <p:extLst>
       <p:ext uri="{BB962C8B-B14F-4D97-AF65-F5344CB8AC3E}">
-        <p14:creationId xmlns="" xmlns:p14="http://schemas.microsoft.com/office/powerpoint/2010/main" val="1085717763"/>
+        <p14:creationId xmlns:p14="http://schemas.microsoft.com/office/powerpoint/2010/main" xmlns="" val="1085717763"/>
       </p:ext>
     </p:extLst>
   </p:cSld>
@@ -3984,7 +3999,7 @@
     </p:spTree>
     <p:extLst>
       <p:ext uri="{BB962C8B-B14F-4D97-AF65-F5344CB8AC3E}">
-        <p14:creationId xmlns="" xmlns:p14="http://schemas.microsoft.com/office/powerpoint/2010/main" val="1085717763"/>
+        <p14:creationId xmlns:p14="http://schemas.microsoft.com/office/powerpoint/2010/main" xmlns="" val="1085717763"/>
       </p:ext>
     </p:extLst>
   </p:cSld>
@@ -4050,7 +4065,7 @@
     </p:spTree>
     <p:extLst>
       <p:ext uri="{BB962C8B-B14F-4D97-AF65-F5344CB8AC3E}">
-        <p14:creationId xmlns="" xmlns:p14="http://schemas.microsoft.com/office/powerpoint/2010/main" val="1085717763"/>
+        <p14:creationId xmlns:p14="http://schemas.microsoft.com/office/powerpoint/2010/main" xmlns="" val="1085717763"/>
       </p:ext>
     </p:extLst>
   </p:cSld>
@@ -4349,7 +4364,7 @@
           </a:bodyPr>
           <a:lstStyle/>
           <a:p>
-            <a:endParaRPr/>
+            <a:endParaRPr dirty="0"/>
           </a:p>
         </p:txBody>
       </p:sp>
@@ -4659,7 +4674,7 @@
           </a:bodyPr>
           <a:lstStyle/>
           <a:p>
-            <a:endParaRPr/>
+            <a:endParaRPr dirty="0"/>
           </a:p>
         </p:txBody>
       </p:sp>
@@ -4853,7 +4868,7 @@
           </a:bodyPr>
           <a:lstStyle/>
           <a:p>
-            <a:endParaRPr/>
+            <a:endParaRPr dirty="0"/>
           </a:p>
         </p:txBody>
       </p:sp>
@@ -5102,7 +5117,7 @@
           </a:bodyPr>
           <a:lstStyle/>
           <a:p>
-            <a:endParaRPr/>
+            <a:endParaRPr dirty="0"/>
           </a:p>
         </p:txBody>
       </p:sp>
@@ -5284,7 +5299,7 @@
           </a:bodyPr>
           <a:lstStyle/>
           <a:p>
-            <a:endParaRPr/>
+            <a:endParaRPr dirty="0"/>
           </a:p>
         </p:txBody>
       </p:sp>
@@ -6249,7 +6264,7 @@
               <a:t>Carrera: Ingeniería en Sistemas. Dpto. de </a:t>
             </a:r>
             <a:r>
-              <a:rPr lang="es-AR" sz="1400" dirty="0" err="1" smtClean="0"/>
+              <a:rPr lang="es-AR" sz="1400" dirty="0" smtClean="0"/>
               <a:t>Cs.</a:t>
             </a:r>
             <a:r>
@@ -6269,7 +6284,7 @@
               <a:t>Docentes: </a:t>
             </a:r>
             <a:r>
-              <a:rPr lang="es-AR" sz="1400" dirty="0" err="1" smtClean="0"/>
+              <a:rPr lang="es-AR" sz="1400" dirty="0" smtClean="0"/>
               <a:t>Lasso</a:t>
             </a:r>
             <a:r>
@@ -6452,11 +6467,7 @@
             </a:pPr>
             <a:r>
               <a:rPr lang="es-AR" sz="1800" dirty="0" smtClean="0"/>
-              <a:t>N</a:t>
-            </a:r>
-            <a:r>
-              <a:rPr lang="es-AR" sz="1800" dirty="0" smtClean="0"/>
-              <a:t>o se usaron librerías existentes de java para simulación de eventos discretos.</a:t>
+              <a:t>No se usaron librerías existentes de java para simulación de eventos discretos.</a:t>
             </a:r>
             <a:endParaRPr lang="x-none" sz="1800"/>
           </a:p>
@@ -6607,17 +6618,7 @@
                   </a:schemeClr>
                 </a:solidFill>
               </a:rPr>
-              <a:t>Diagrama de </a:t>
-            </a:r>
-            <a:r>
-              <a:rPr lang="es-AR" sz="1800" b="1" dirty="0" smtClean="0">
-                <a:solidFill>
-                  <a:schemeClr val="tx2">
-                    <a:lumMod val="50000"/>
-                  </a:schemeClr>
-                </a:solidFill>
-              </a:rPr>
-              <a:t>clases</a:t>
+              <a:t>Diagrama de clases</a:t>
             </a:r>
             <a:endParaRPr lang="x-none" sz="1800" b="1">
               <a:solidFill>
@@ -6761,7 +6762,7 @@
         </p:nvGraphicFramePr>
         <p:xfrm>
           <a:off x="71406" y="1277124"/>
-          <a:ext cx="4286280" cy="3009138"/>
+          <a:ext cx="4286280" cy="2812542"/>
         </p:xfrm>
         <a:graphic>
           <a:graphicData uri="http://schemas.openxmlformats.org/drawingml/2006/table">
@@ -6786,7 +6787,7 @@
                         </a:spcAft>
                       </a:pPr>
                       <a:r>
-                        <a:rPr lang="es-AR" sz="1100" b="1" dirty="0" err="1">
+                        <a:rPr lang="es-AR" sz="1100" b="1" dirty="0">
                           <a:solidFill>
                             <a:srgbClr val="000000"/>
                           </a:solidFill>
@@ -6874,7 +6875,7 @@
                         </a:spcAft>
                       </a:pPr>
                       <a:r>
-                        <a:rPr lang="es-AR" sz="1100">
+                        <a:rPr lang="es-AR" sz="1100" dirty="0">
                           <a:solidFill>
                             <a:srgbClr val="000000"/>
                           </a:solidFill>
@@ -6884,7 +6885,7 @@
                         </a:rPr>
                         <a:t>Clase principal del modelo. Provee la funcionalidad del núcleo del modelo.</a:t>
                       </a:r>
-                      <a:endParaRPr lang="es-AR" sz="1100">
+                      <a:endParaRPr lang="es-AR" sz="1100" dirty="0">
                         <a:solidFill>
                           <a:srgbClr val="000000"/>
                         </a:solidFill>
@@ -6959,7 +6960,7 @@
                         </a:spcAft>
                       </a:pPr>
                       <a:r>
-                        <a:rPr lang="es-AR" sz="1100" b="1">
+                        <a:rPr lang="es-AR" sz="1100" b="1" dirty="0">
                           <a:solidFill>
                             <a:srgbClr val="000000"/>
                           </a:solidFill>
@@ -6969,7 +6970,7 @@
                         </a:rPr>
                         <a:t>Atributos</a:t>
                       </a:r>
-                      <a:endParaRPr lang="es-AR" sz="1100">
+                      <a:endParaRPr lang="es-AR" sz="1100" dirty="0">
                         <a:solidFill>
                           <a:srgbClr val="000000"/>
                         </a:solidFill>
@@ -7047,7 +7048,7 @@
                         </a:spcAft>
                       </a:pPr>
                       <a:r>
-                        <a:rPr lang="es-AR" sz="1100">
+                        <a:rPr lang="es-AR" sz="1100" dirty="0">
                           <a:solidFill>
                             <a:srgbClr val="000000"/>
                           </a:solidFill>
@@ -7057,7 +7058,7 @@
                         </a:rPr>
                         <a:t>TE</a:t>
                       </a:r>
-                      <a:endParaRPr lang="es-AR" sz="1100">
+                      <a:endParaRPr lang="es-AR" sz="1100" dirty="0">
                         <a:solidFill>
                           <a:srgbClr val="000000"/>
                         </a:solidFill>
@@ -7117,14 +7118,14 @@
                         </a:spcAft>
                       </a:pPr>
                       <a:r>
-                        <a:rPr lang="es-AR" sz="1100">
+                        <a:rPr lang="es-AR" sz="1100" dirty="0">
                           <a:latin typeface="Arial"/>
                           <a:ea typeface="Arial"/>
                           <a:cs typeface="Times New Roman"/>
                         </a:rPr>
                         <a:t>Tiempos entre llegadas</a:t>
                       </a:r>
-                      <a:endParaRPr lang="es-AR" sz="1100">
+                      <a:endParaRPr lang="es-AR" sz="1100" dirty="0">
                         <a:latin typeface="Arial"/>
                         <a:ea typeface="Times New Roman"/>
                         <a:cs typeface="Times New Roman"/>
@@ -7186,7 +7187,7 @@
                         </a:spcAft>
                       </a:pPr>
                       <a:r>
-                        <a:rPr lang="es-AR" sz="1100">
+                        <a:rPr lang="es-AR" sz="1100" dirty="0">
                           <a:solidFill>
                             <a:srgbClr val="000000"/>
                           </a:solidFill>
@@ -7196,7 +7197,7 @@
                         </a:rPr>
                         <a:t>TS</a:t>
                       </a:r>
-                      <a:endParaRPr lang="es-AR" sz="1100">
+                      <a:endParaRPr lang="es-AR" sz="1100" dirty="0">
                         <a:solidFill>
                           <a:srgbClr val="000000"/>
                         </a:solidFill>
@@ -7256,14 +7257,14 @@
                         </a:spcAft>
                       </a:pPr>
                       <a:r>
-                        <a:rPr lang="es-AR" sz="1100">
+                        <a:rPr lang="es-AR" sz="1100" dirty="0">
                           <a:latin typeface="Arial"/>
                           <a:ea typeface="Arial"/>
                           <a:cs typeface="Times New Roman"/>
                         </a:rPr>
                         <a:t>Tiempo de servicio</a:t>
                       </a:r>
-                      <a:endParaRPr lang="es-AR" sz="1100">
+                      <a:endParaRPr lang="es-AR" sz="1100" dirty="0">
                         <a:latin typeface="Arial"/>
                         <a:ea typeface="Times New Roman"/>
                         <a:cs typeface="Times New Roman"/>
@@ -7325,7 +7326,7 @@
                         </a:spcAft>
                       </a:pPr>
                       <a:r>
-                        <a:rPr lang="es-AR" sz="1100">
+                        <a:rPr lang="es-AR" sz="1100" dirty="0">
                           <a:solidFill>
                             <a:srgbClr val="000000"/>
                           </a:solidFill>
@@ -7335,7 +7336,7 @@
                         </a:rPr>
                         <a:t>TM</a:t>
                       </a:r>
-                      <a:endParaRPr lang="es-AR" sz="1100">
+                      <a:endParaRPr lang="es-AR" sz="1100" dirty="0">
                         <a:solidFill>
                           <a:srgbClr val="000000"/>
                         </a:solidFill>
@@ -7395,14 +7396,14 @@
                         </a:spcAft>
                       </a:pPr>
                       <a:r>
-                        <a:rPr lang="es-AR" sz="1100">
+                        <a:rPr lang="es-AR" sz="1100" dirty="0">
                           <a:latin typeface="Arial"/>
                           <a:ea typeface="Arial"/>
                           <a:cs typeface="Times New Roman"/>
                         </a:rPr>
                         <a:t>Tiempo de reloj de la simulación (tiempo actual)</a:t>
                       </a:r>
-                      <a:endParaRPr lang="es-AR" sz="1100">
+                      <a:endParaRPr lang="es-AR" sz="1100" dirty="0">
                         <a:latin typeface="Arial"/>
                         <a:ea typeface="Times New Roman"/>
                         <a:cs typeface="Times New Roman"/>
@@ -7464,7 +7465,7 @@
                         </a:spcAft>
                       </a:pPr>
                       <a:r>
-                        <a:rPr lang="es-AR" sz="1100">
+                        <a:rPr lang="es-AR" sz="1100" dirty="0">
                           <a:solidFill>
                             <a:srgbClr val="000000"/>
                           </a:solidFill>
@@ -7474,7 +7475,7 @@
                         </a:rPr>
                         <a:t>AT</a:t>
                       </a:r>
-                      <a:endParaRPr lang="es-AR" sz="1100">
+                      <a:endParaRPr lang="es-AR" sz="1100" dirty="0">
                         <a:solidFill>
                           <a:srgbClr val="000000"/>
                         </a:solidFill>
@@ -7603,7 +7604,7 @@
                         </a:spcAft>
                       </a:pPr>
                       <a:r>
-                        <a:rPr lang="es-AR" sz="1100">
+                        <a:rPr lang="es-AR" sz="1100" dirty="0">
                           <a:solidFill>
                             <a:srgbClr val="000000"/>
                           </a:solidFill>
@@ -7613,7 +7614,7 @@
                         </a:rPr>
                         <a:t>DT</a:t>
                       </a:r>
-                      <a:endParaRPr lang="es-AR" sz="1100">
+                      <a:endParaRPr lang="es-AR" sz="1100" dirty="0">
                         <a:solidFill>
                           <a:srgbClr val="000000"/>
                         </a:solidFill>
@@ -7673,14 +7674,14 @@
                         </a:spcAft>
                       </a:pPr>
                       <a:r>
-                        <a:rPr lang="es-AR" sz="1100">
+                        <a:rPr lang="es-AR" sz="1100" dirty="0">
                           <a:latin typeface="Arial"/>
                           <a:ea typeface="Arial"/>
                           <a:cs typeface="Times New Roman"/>
                         </a:rPr>
                         <a:t>Tiempo de la siguiente salida</a:t>
                       </a:r>
-                      <a:endParaRPr lang="es-AR" sz="1100">
+                      <a:endParaRPr lang="es-AR" sz="1100" dirty="0">
                         <a:latin typeface="Arial"/>
                         <a:ea typeface="Times New Roman"/>
                         <a:cs typeface="Times New Roman"/>
@@ -7742,7 +7743,7 @@
                         </a:spcAft>
                       </a:pPr>
                       <a:r>
-                        <a:rPr lang="es-AR" sz="1100">
+                        <a:rPr lang="es-AR" sz="1100" dirty="0">
                           <a:solidFill>
                             <a:srgbClr val="000000"/>
                           </a:solidFill>
@@ -7752,7 +7753,7 @@
                         </a:rPr>
                         <a:t>MX</a:t>
                       </a:r>
-                      <a:endParaRPr lang="es-AR" sz="1100">
+                      <a:endParaRPr lang="es-AR" sz="1100" dirty="0">
                         <a:solidFill>
                           <a:srgbClr val="000000"/>
                         </a:solidFill>
@@ -7812,14 +7813,14 @@
                         </a:spcAft>
                       </a:pPr>
                       <a:r>
-                        <a:rPr lang="es-AR" sz="1100">
+                        <a:rPr lang="es-AR" sz="1100" dirty="0">
                           <a:latin typeface="Arial"/>
                           <a:ea typeface="Arial"/>
                           <a:cs typeface="Times New Roman"/>
                         </a:rPr>
                         <a:t>Tiempo máximo de simulación. Establece el tiempo limite a partir del cual dejan de ingresar llamadas al sistema</a:t>
                       </a:r>
-                      <a:endParaRPr lang="es-AR" sz="1100">
+                      <a:endParaRPr lang="es-AR" sz="1100" dirty="0">
                         <a:latin typeface="Arial"/>
                         <a:ea typeface="Times New Roman"/>
                         <a:cs typeface="Times New Roman"/>
@@ -7881,7 +7882,7 @@
                         </a:spcAft>
                       </a:pPr>
                       <a:r>
-                        <a:rPr lang="es-AR" sz="1100">
+                        <a:rPr lang="es-AR" sz="1100" dirty="0">
                           <a:solidFill>
                             <a:srgbClr val="000000"/>
                           </a:solidFill>
@@ -7891,7 +7892,7 @@
                         </a:rPr>
                         <a:t>NA</a:t>
                       </a:r>
-                      <a:endParaRPr lang="es-AR" sz="1100">
+                      <a:endParaRPr lang="es-AR" sz="1100" dirty="0">
                         <a:solidFill>
                           <a:srgbClr val="000000"/>
                         </a:solidFill>
@@ -7951,14 +7952,14 @@
                         </a:spcAft>
                       </a:pPr>
                       <a:r>
-                        <a:rPr lang="es-AR" sz="1100">
+                        <a:rPr lang="es-AR" sz="1100" dirty="0">
                           <a:latin typeface="Arial"/>
                           <a:ea typeface="Arial"/>
                           <a:cs typeface="Times New Roman"/>
                         </a:rPr>
                         <a:t>Número de llegadas hasta el instante TM</a:t>
                       </a:r>
-                      <a:endParaRPr lang="es-AR" sz="1100">
+                      <a:endParaRPr lang="es-AR" sz="1100" dirty="0">
                         <a:latin typeface="Arial"/>
                         <a:ea typeface="Times New Roman"/>
                         <a:cs typeface="Times New Roman"/>
@@ -8020,7 +8021,7 @@
                         </a:spcAft>
                       </a:pPr>
                       <a:r>
-                        <a:rPr lang="es-AR" sz="1100">
+                        <a:rPr lang="es-AR" sz="1100" dirty="0">
                           <a:solidFill>
                             <a:srgbClr val="000000"/>
                           </a:solidFill>
@@ -8030,7 +8031,7 @@
                         </a:rPr>
                         <a:t>ND</a:t>
                       </a:r>
-                      <a:endParaRPr lang="es-AR" sz="1100">
+                      <a:endParaRPr lang="es-AR" sz="1100" dirty="0">
                         <a:solidFill>
                           <a:srgbClr val="000000"/>
                         </a:solidFill>
@@ -8090,14 +8091,14 @@
                         </a:spcAft>
                       </a:pPr>
                       <a:r>
-                        <a:rPr lang="es-AR" sz="1100">
+                        <a:rPr lang="es-AR" sz="1100" dirty="0">
                           <a:latin typeface="Arial"/>
                           <a:ea typeface="Arial"/>
                           <a:cs typeface="Times New Roman"/>
                         </a:rPr>
                         <a:t>Número de salidas hasta el instante TM</a:t>
                       </a:r>
-                      <a:endParaRPr lang="es-AR" sz="1100">
+                      <a:endParaRPr lang="es-AR" sz="1100" dirty="0">
                         <a:latin typeface="Arial"/>
                         <a:ea typeface="Times New Roman"/>
                         <a:cs typeface="Times New Roman"/>
@@ -8159,7 +8160,7 @@
                         </a:spcAft>
                       </a:pPr>
                       <a:r>
-                        <a:rPr lang="es-AR" sz="1100">
+                        <a:rPr lang="es-AR" sz="1100" dirty="0">
                           <a:solidFill>
                             <a:srgbClr val="000000"/>
                           </a:solidFill>
@@ -8169,155 +8170,7 @@
                         </a:rPr>
                         <a:t>n</a:t>
                       </a:r>
-                      <a:endParaRPr lang="es-AR" sz="1100">
-                        <a:solidFill>
-                          <a:srgbClr val="000000"/>
-                        </a:solidFill>
-                        <a:latin typeface="Arial"/>
-                        <a:ea typeface="Arial"/>
-                        <a:cs typeface="Times New Roman"/>
-                      </a:endParaRPr>
-                    </a:p>
-                  </a:txBody>
-                  <a:tcPr marL="68580" marR="68580" marT="0" marB="0">
-                    <a:lnL w="12700" cap="flat" cmpd="sng" algn="ctr">
-                      <a:solidFill>
-                        <a:srgbClr val="000000"/>
-                      </a:solidFill>
-                      <a:prstDash val="solid"/>
-                      <a:round/>
-                      <a:headEnd type="none" w="med" len="med"/>
-                      <a:tailEnd type="none" w="med" len="med"/>
-                    </a:lnL>
-                    <a:lnR w="12700" cap="flat" cmpd="sng" algn="ctr">
-                      <a:solidFill>
-                        <a:srgbClr val="000000"/>
-                      </a:solidFill>
-                      <a:prstDash val="solid"/>
-                      <a:round/>
-                      <a:headEnd type="none" w="med" len="med"/>
-                      <a:tailEnd type="none" w="med" len="med"/>
-                    </a:lnR>
-                    <a:lnT w="12700" cap="flat" cmpd="sng" algn="ctr">
-                      <a:solidFill>
-                        <a:srgbClr val="000000"/>
-                      </a:solidFill>
-                      <a:prstDash val="solid"/>
-                      <a:round/>
-                      <a:headEnd type="none" w="med" len="med"/>
-                      <a:tailEnd type="none" w="med" len="med"/>
-                    </a:lnT>
-                    <a:lnB w="12700" cap="flat" cmpd="sng" algn="ctr">
-                      <a:solidFill>
-                        <a:srgbClr val="000000"/>
-                      </a:solidFill>
-                      <a:prstDash val="solid"/>
-                      <a:round/>
-                      <a:headEnd type="none" w="med" len="med"/>
-                      <a:tailEnd type="none" w="med" len="med"/>
-                    </a:lnB>
-                  </a:tcPr>
-                </a:tc>
-                <a:tc>
-                  <a:txBody>
-                    <a:bodyPr/>
-                    <a:lstStyle/>
-                    <a:p>
-                      <a:pPr algn="just">
-                        <a:lnSpc>
-                          <a:spcPct val="115000"/>
-                        </a:lnSpc>
-                        <a:spcAft>
-                          <a:spcPts val="0"/>
-                        </a:spcAft>
-                      </a:pPr>
-                      <a:r>
-                        <a:rPr lang="es-AR" sz="1100">
-                          <a:solidFill>
-                            <a:srgbClr val="000000"/>
-                          </a:solidFill>
-                          <a:latin typeface="Arial"/>
-                          <a:ea typeface="Liberation Sans"/>
-                          <a:cs typeface="Times New Roman"/>
-                        </a:rPr>
-                        <a:t>Número de clientes en el sistema en el instante TM</a:t>
-                      </a:r>
-                      <a:endParaRPr lang="es-AR" sz="1100">
-                        <a:solidFill>
-                          <a:srgbClr val="000000"/>
-                        </a:solidFill>
-                        <a:latin typeface="Arial"/>
-                        <a:ea typeface="Arial"/>
-                        <a:cs typeface="Times New Roman"/>
-                      </a:endParaRPr>
-                    </a:p>
-                  </a:txBody>
-                  <a:tcPr marL="68580" marR="68580" marT="0" marB="0">
-                    <a:lnL w="12700" cap="flat" cmpd="sng" algn="ctr">
-                      <a:solidFill>
-                        <a:srgbClr val="000000"/>
-                      </a:solidFill>
-                      <a:prstDash val="solid"/>
-                      <a:round/>
-                      <a:headEnd type="none" w="med" len="med"/>
-                      <a:tailEnd type="none" w="med" len="med"/>
-                    </a:lnL>
-                    <a:lnR w="12700" cap="flat" cmpd="sng" algn="ctr">
-                      <a:solidFill>
-                        <a:srgbClr val="000000"/>
-                      </a:solidFill>
-                      <a:prstDash val="solid"/>
-                      <a:round/>
-                      <a:headEnd type="none" w="med" len="med"/>
-                      <a:tailEnd type="none" w="med" len="med"/>
-                    </a:lnR>
-                    <a:lnT w="12700" cap="flat" cmpd="sng" algn="ctr">
-                      <a:solidFill>
-                        <a:srgbClr val="000000"/>
-                      </a:solidFill>
-                      <a:prstDash val="solid"/>
-                      <a:round/>
-                      <a:headEnd type="none" w="med" len="med"/>
-                      <a:tailEnd type="none" w="med" len="med"/>
-                    </a:lnT>
-                    <a:lnB w="12700" cap="flat" cmpd="sng" algn="ctr">
-                      <a:solidFill>
-                        <a:srgbClr val="000000"/>
-                      </a:solidFill>
-                      <a:prstDash val="solid"/>
-                      <a:round/>
-                      <a:headEnd type="none" w="med" len="med"/>
-                      <a:tailEnd type="none" w="med" len="med"/>
-                    </a:lnB>
-                  </a:tcPr>
-                </a:tc>
-              </a:tr>
-              <a:tr h="161188">
-                <a:tc>
-                  <a:txBody>
-                    <a:bodyPr/>
-                    <a:lstStyle/>
-                    <a:p>
-                      <a:pPr algn="just">
-                        <a:lnSpc>
-                          <a:spcPct val="115000"/>
-                        </a:lnSpc>
-                        <a:spcAft>
-                          <a:spcPts val="0"/>
-                        </a:spcAft>
-                      </a:pPr>
-                      <a:r>
-                        <a:rPr lang="es-AR" sz="1100">
-                          <a:solidFill>
-                            <a:srgbClr val="000000"/>
-                          </a:solidFill>
-                          <a:latin typeface="Arial"/>
-                          <a:ea typeface="Liberation Sans"/>
-                          <a:cs typeface="Times New Roman"/>
-                        </a:rPr>
-                        <a:t>clientes</a:t>
-                      </a:r>
-                      <a:endParaRPr lang="es-AR" sz="1100">
+                      <a:endParaRPr lang="es-AR" sz="1100" dirty="0">
                         <a:solidFill>
                           <a:srgbClr val="000000"/>
                         </a:solidFill>
@@ -8388,19 +8241,72 @@
                           <a:ea typeface="Liberation Sans"/>
                           <a:cs typeface="Times New Roman"/>
                         </a:rPr>
-                        <a:t>Un </a:t>
+                        <a:t>Número de clientes en el sistema en el instante TM</a:t>
                       </a:r>
-                      <a:r>
-                        <a:rPr lang="es-AR" sz="1100" dirty="0" err="1">
-                          <a:solidFill>
-                            <a:srgbClr val="000000"/>
-                          </a:solidFill>
-                          <a:latin typeface="Arial"/>
-                          <a:ea typeface="Liberation Sans"/>
-                          <a:cs typeface="Times New Roman"/>
-                        </a:rPr>
-                        <a:t>ArrayList</a:t>
-                      </a:r>
+                      <a:endParaRPr lang="es-AR" sz="1100" dirty="0">
+                        <a:solidFill>
+                          <a:srgbClr val="000000"/>
+                        </a:solidFill>
+                        <a:latin typeface="Arial"/>
+                        <a:ea typeface="Arial"/>
+                        <a:cs typeface="Times New Roman"/>
+                      </a:endParaRPr>
+                    </a:p>
+                  </a:txBody>
+                  <a:tcPr marL="68580" marR="68580" marT="0" marB="0">
+                    <a:lnL w="12700" cap="flat" cmpd="sng" algn="ctr">
+                      <a:solidFill>
+                        <a:srgbClr val="000000"/>
+                      </a:solidFill>
+                      <a:prstDash val="solid"/>
+                      <a:round/>
+                      <a:headEnd type="none" w="med" len="med"/>
+                      <a:tailEnd type="none" w="med" len="med"/>
+                    </a:lnL>
+                    <a:lnR w="12700" cap="flat" cmpd="sng" algn="ctr">
+                      <a:solidFill>
+                        <a:srgbClr val="000000"/>
+                      </a:solidFill>
+                      <a:prstDash val="solid"/>
+                      <a:round/>
+                      <a:headEnd type="none" w="med" len="med"/>
+                      <a:tailEnd type="none" w="med" len="med"/>
+                    </a:lnR>
+                    <a:lnT w="12700" cap="flat" cmpd="sng" algn="ctr">
+                      <a:solidFill>
+                        <a:srgbClr val="000000"/>
+                      </a:solidFill>
+                      <a:prstDash val="solid"/>
+                      <a:round/>
+                      <a:headEnd type="none" w="med" len="med"/>
+                      <a:tailEnd type="none" w="med" len="med"/>
+                    </a:lnT>
+                    <a:lnB w="12700" cap="flat" cmpd="sng" algn="ctr">
+                      <a:solidFill>
+                        <a:srgbClr val="000000"/>
+                      </a:solidFill>
+                      <a:prstDash val="solid"/>
+                      <a:round/>
+                      <a:headEnd type="none" w="med" len="med"/>
+                      <a:tailEnd type="none" w="med" len="med"/>
+                    </a:lnB>
+                  </a:tcPr>
+                </a:tc>
+              </a:tr>
+              <a:tr h="161188">
+                <a:tc>
+                  <a:txBody>
+                    <a:bodyPr/>
+                    <a:lstStyle/>
+                    <a:p>
+                      <a:pPr algn="just">
+                        <a:lnSpc>
+                          <a:spcPct val="115000"/>
+                        </a:lnSpc>
+                        <a:spcAft>
+                          <a:spcPts val="0"/>
+                        </a:spcAft>
+                      </a:pPr>
                       <a:r>
                         <a:rPr lang="es-AR" sz="1100" dirty="0">
                           <a:solidFill>
@@ -8410,7 +8316,80 @@
                           <a:ea typeface="Liberation Sans"/>
                           <a:cs typeface="Times New Roman"/>
                         </a:rPr>
-                        <a:t> de clientes</a:t>
+                        <a:t>clientes</a:t>
+                      </a:r>
+                      <a:endParaRPr lang="es-AR" sz="1100" dirty="0">
+                        <a:solidFill>
+                          <a:srgbClr val="000000"/>
+                        </a:solidFill>
+                        <a:latin typeface="Arial"/>
+                        <a:ea typeface="Arial"/>
+                        <a:cs typeface="Times New Roman"/>
+                      </a:endParaRPr>
+                    </a:p>
+                  </a:txBody>
+                  <a:tcPr marL="68580" marR="68580" marT="0" marB="0">
+                    <a:lnL w="12700" cap="flat" cmpd="sng" algn="ctr">
+                      <a:solidFill>
+                        <a:srgbClr val="000000"/>
+                      </a:solidFill>
+                      <a:prstDash val="solid"/>
+                      <a:round/>
+                      <a:headEnd type="none" w="med" len="med"/>
+                      <a:tailEnd type="none" w="med" len="med"/>
+                    </a:lnL>
+                    <a:lnR w="12700" cap="flat" cmpd="sng" algn="ctr">
+                      <a:solidFill>
+                        <a:srgbClr val="000000"/>
+                      </a:solidFill>
+                      <a:prstDash val="solid"/>
+                      <a:round/>
+                      <a:headEnd type="none" w="med" len="med"/>
+                      <a:tailEnd type="none" w="med" len="med"/>
+                    </a:lnR>
+                    <a:lnT w="12700" cap="flat" cmpd="sng" algn="ctr">
+                      <a:solidFill>
+                        <a:srgbClr val="000000"/>
+                      </a:solidFill>
+                      <a:prstDash val="solid"/>
+                      <a:round/>
+                      <a:headEnd type="none" w="med" len="med"/>
+                      <a:tailEnd type="none" w="med" len="med"/>
+                    </a:lnT>
+                    <a:lnB w="12700" cap="flat" cmpd="sng" algn="ctr">
+                      <a:solidFill>
+                        <a:srgbClr val="000000"/>
+                      </a:solidFill>
+                      <a:prstDash val="solid"/>
+                      <a:round/>
+                      <a:headEnd type="none" w="med" len="med"/>
+                      <a:tailEnd type="none" w="med" len="med"/>
+                    </a:lnB>
+                  </a:tcPr>
+                </a:tc>
+                <a:tc>
+                  <a:txBody>
+                    <a:bodyPr/>
+                    <a:lstStyle/>
+                    <a:p>
+                      <a:pPr algn="just">
+                        <a:lnSpc>
+                          <a:spcPct val="115000"/>
+                        </a:lnSpc>
+                        <a:spcAft>
+                          <a:spcPts val="0"/>
+                        </a:spcAft>
+                      </a:pPr>
+                      <a:r>
+                        <a:rPr lang="es-AR" sz="1100" dirty="0">
+                          <a:solidFill>
+                            <a:srgbClr val="000000"/>
+                          </a:solidFill>
+                          <a:latin typeface="Arial"/>
+                          <a:ea typeface="Liberation Sans"/>
+                          <a:cs typeface="Times New Roman"/>
+                        </a:rPr>
+                        <a:t>Un ArrayList de clientes</a:t>
                       </a:r>
                       <a:endParaRPr lang="es-AR" sz="1100" dirty="0">
                         <a:solidFill>
@@ -8476,7 +8455,7 @@
         </p:nvGraphicFramePr>
         <p:xfrm>
           <a:off x="4500562" y="1285866"/>
-          <a:ext cx="4500562" cy="3344799"/>
+          <a:ext cx="4500562" cy="3279267"/>
         </p:xfrm>
         <a:graphic>
           <a:graphicData uri="http://schemas.openxmlformats.org/drawingml/2006/table">
@@ -8577,39 +8556,7 @@
                           <a:ea typeface="Arial"/>
                           <a:cs typeface="Times New Roman"/>
                         </a:rPr>
-                        <a:t>Un </a:t>
-                      </a:r>
-                      <a:r>
-                        <a:rPr lang="es-AR" sz="1100" dirty="0" err="1">
-                          <a:latin typeface="Arial"/>
-                          <a:ea typeface="Arial"/>
-                          <a:cs typeface="Times New Roman"/>
-                        </a:rPr>
-                        <a:t>ArrayList</a:t>
-                      </a:r>
-                      <a:r>
-                        <a:rPr lang="es-AR" sz="1100" dirty="0">
-                          <a:latin typeface="Arial"/>
-                          <a:ea typeface="Arial"/>
-                          <a:cs typeface="Times New Roman"/>
-                        </a:rPr>
-                        <a:t> de eventos. Representa un </a:t>
-                      </a:r>
-                      <a:r>
-                        <a:rPr lang="es-AR" sz="1100" dirty="0" err="1">
-                          <a:latin typeface="Arial"/>
-                          <a:ea typeface="Arial"/>
-                          <a:cs typeface="Times New Roman"/>
-                        </a:rPr>
-                        <a:t>Array</a:t>
-                      </a:r>
-                      <a:r>
-                        <a:rPr lang="es-AR" sz="1100" dirty="0">
-                          <a:latin typeface="Arial"/>
-                          <a:ea typeface="Arial"/>
-                          <a:cs typeface="Times New Roman"/>
-                        </a:rPr>
-                        <a:t> dinámico de elementos de tipo “evento” en el cual se van añadiendo los eventos de llegada o de salida que va generando el sistema</a:t>
+                        <a:t>Un ArrayList de eventos. Representa un Array dinámico de elementos de tipo “evento” en el cual se van añadiendo los eventos de llegada o de salida que va generando el sistema</a:t>
                       </a:r>
                       <a:endParaRPr lang="es-AR" sz="1100" dirty="0">
                         <a:latin typeface="Arial"/>
@@ -8683,7 +8630,7 @@
                         </a:spcAft>
                       </a:pPr>
                       <a:r>
-                        <a:rPr lang="es-AR" sz="1100" dirty="0" err="1">
+                        <a:rPr lang="es-AR" sz="1100" dirty="0">
                           <a:solidFill>
                             <a:srgbClr val="000000"/>
                           </a:solidFill>
@@ -8753,14 +8700,14 @@
                         </a:spcAft>
                       </a:pPr>
                       <a:r>
-                        <a:rPr lang="es-AR" sz="1100">
+                        <a:rPr lang="es-AR" sz="1100" dirty="0">
                           <a:latin typeface="Arial"/>
                           <a:ea typeface="Arial"/>
                           <a:cs typeface="Times New Roman"/>
                         </a:rPr>
                         <a:t>Guarda la cantidad de enlaces ingresada por el usuario en tiempo de ejecución para una determinada corrida</a:t>
                       </a:r>
-                      <a:endParaRPr lang="es-AR" sz="1100">
+                      <a:endParaRPr lang="es-AR" sz="1100" dirty="0">
                         <a:latin typeface="Arial"/>
                         <a:ea typeface="Times New Roman"/>
                         <a:cs typeface="Times New Roman"/>
@@ -8832,7 +8779,7 @@
                         </a:spcAft>
                       </a:pPr>
                       <a:r>
-                        <a:rPr lang="es-AR" sz="1100">
+                        <a:rPr lang="es-AR" sz="1100" dirty="0">
                           <a:solidFill>
                             <a:srgbClr val="000000"/>
                           </a:solidFill>
@@ -8842,7 +8789,7 @@
                         </a:rPr>
                         <a:t>cantTelefonos</a:t>
                       </a:r>
-                      <a:endParaRPr lang="es-AR" sz="1100">
+                      <a:endParaRPr lang="es-AR" sz="1100" dirty="0">
                         <a:solidFill>
                           <a:srgbClr val="000000"/>
                         </a:solidFill>
@@ -8902,14 +8849,14 @@
                         </a:spcAft>
                       </a:pPr>
                       <a:r>
-                        <a:rPr lang="es-AR" sz="1100">
+                        <a:rPr lang="es-AR" sz="1100" dirty="0">
                           <a:latin typeface="Arial"/>
                           <a:ea typeface="Arial"/>
                           <a:cs typeface="Times New Roman"/>
                         </a:rPr>
                         <a:t>Guarda la cantidad de teléfonos ingresada por el usuario en tiempo de ejecución para una determinada corrida</a:t>
                       </a:r>
-                      <a:endParaRPr lang="es-AR" sz="1100">
+                      <a:endParaRPr lang="es-AR" sz="1100" dirty="0">
                         <a:latin typeface="Arial"/>
                         <a:ea typeface="Times New Roman"/>
                         <a:cs typeface="Times New Roman"/>
@@ -8981,7 +8928,7 @@
                         </a:spcAft>
                       </a:pPr>
                       <a:r>
-                        <a:rPr lang="es-AR" sz="1100">
+                        <a:rPr lang="es-AR" sz="1100" dirty="0">
                           <a:solidFill>
                             <a:srgbClr val="000000"/>
                           </a:solidFill>
@@ -8991,7 +8938,7 @@
                         </a:rPr>
                         <a:t>con</a:t>
                       </a:r>
-                      <a:endParaRPr lang="es-AR" sz="1100">
+                      <a:endParaRPr lang="es-AR" sz="1100" dirty="0">
                         <a:solidFill>
                           <a:srgbClr val="000000"/>
                         </a:solidFill>
@@ -9051,14 +8998,14 @@
                         </a:spcAft>
                       </a:pPr>
                       <a:r>
-                        <a:rPr lang="es-AR" sz="1100">
+                        <a:rPr lang="es-AR" sz="1100" dirty="0">
                           <a:latin typeface="Arial"/>
                           <a:ea typeface="Arial"/>
                           <a:cs typeface="Times New Roman"/>
                         </a:rPr>
                         <a:t>Un objeto de tipo Conmutador</a:t>
                       </a:r>
-                      <a:endParaRPr lang="es-AR" sz="1100">
+                      <a:endParaRPr lang="es-AR" sz="1100" dirty="0">
                         <a:latin typeface="Arial"/>
                         <a:ea typeface="Times New Roman"/>
                         <a:cs typeface="Times New Roman"/>
@@ -9130,7 +9077,7 @@
                         </a:spcAft>
                       </a:pPr>
                       <a:r>
-                        <a:rPr lang="es-AR" sz="1100">
+                        <a:rPr lang="es-AR" sz="1100" dirty="0">
                           <a:solidFill>
                             <a:srgbClr val="000000"/>
                           </a:solidFill>
@@ -9140,7 +9087,7 @@
                         </a:rPr>
                         <a:t>exitosas</a:t>
                       </a:r>
-                      <a:endParaRPr lang="es-AR" sz="1100">
+                      <a:endParaRPr lang="es-AR" sz="1100" dirty="0">
                         <a:solidFill>
                           <a:srgbClr val="000000"/>
                         </a:solidFill>
@@ -9200,14 +9147,14 @@
                         </a:spcAft>
                       </a:pPr>
                       <a:r>
-                        <a:rPr lang="es-AR" sz="1100">
+                        <a:rPr lang="es-AR" sz="1100" dirty="0">
                           <a:latin typeface="Arial"/>
                           <a:ea typeface="Arial"/>
                           <a:cs typeface="Times New Roman"/>
                         </a:rPr>
                         <a:t>Atributo que cuenta durante una corrida la cantidad de llamadas exitosas</a:t>
                       </a:r>
-                      <a:endParaRPr lang="es-AR" sz="1100">
+                      <a:endParaRPr lang="es-AR" sz="1100" dirty="0">
                         <a:latin typeface="Arial"/>
                         <a:ea typeface="Times New Roman"/>
                         <a:cs typeface="Times New Roman"/>
@@ -9279,7 +9226,7 @@
                         </a:spcAft>
                       </a:pPr>
                       <a:r>
-                        <a:rPr lang="es-AR" sz="1100" b="1">
+                        <a:rPr lang="es-AR" sz="1100" b="1" dirty="0">
                           <a:solidFill>
                             <a:srgbClr val="000000"/>
                           </a:solidFill>
@@ -9289,7 +9236,7 @@
                         </a:rPr>
                         <a:t>Métodos</a:t>
                       </a:r>
-                      <a:endParaRPr lang="es-AR" sz="1100">
+                      <a:endParaRPr lang="es-AR" sz="1100" dirty="0">
                         <a:solidFill>
                           <a:srgbClr val="000000"/>
                         </a:solidFill>
@@ -9377,7 +9324,7 @@
                         </a:spcAft>
                       </a:pPr>
                       <a:r>
-                        <a:rPr lang="es-AR" sz="1100">
+                        <a:rPr lang="es-AR" sz="1100" dirty="0">
                           <a:solidFill>
                             <a:srgbClr val="000000"/>
                           </a:solidFill>
@@ -9387,7 +9334,7 @@
                         </a:rPr>
                         <a:t>simular()</a:t>
                       </a:r>
-                      <a:endParaRPr lang="es-AR" sz="1100">
+                      <a:endParaRPr lang="es-AR" sz="1100" dirty="0">
                         <a:solidFill>
                           <a:srgbClr val="000000"/>
                         </a:solidFill>
@@ -9512,7 +9459,7 @@
                         </a:spcAft>
                       </a:pPr>
                       <a:r>
-                        <a:rPr lang="es-AR" sz="1100">
+                        <a:rPr lang="es-AR" sz="1100" dirty="0">
                           <a:solidFill>
                             <a:srgbClr val="000000"/>
                           </a:solidFill>
@@ -9522,7 +9469,7 @@
                         </a:rPr>
                         <a:t>Método principal</a:t>
                       </a:r>
-                      <a:endParaRPr lang="es-AR" sz="1100">
+                      <a:endParaRPr lang="es-AR" sz="1100" dirty="0">
                         <a:solidFill>
                           <a:srgbClr val="000000"/>
                         </a:solidFill>
@@ -9587,7 +9534,7 @@
                         </a:spcAft>
                       </a:pPr>
                       <a:r>
-                        <a:rPr lang="es-AR" sz="1100">
+                        <a:rPr lang="es-AR" sz="1100" dirty="0">
                           <a:solidFill>
                             <a:srgbClr val="000000"/>
                           </a:solidFill>
@@ -9597,7 +9544,7 @@
                         </a:rPr>
                         <a:t>imprimirResultados()</a:t>
                       </a:r>
-                      <a:endParaRPr lang="es-AR" sz="1100">
+                      <a:endParaRPr lang="es-AR" sz="1100" dirty="0">
                         <a:solidFill>
                           <a:srgbClr val="000000"/>
                         </a:solidFill>
@@ -9722,7 +9669,7 @@
                         </a:spcAft>
                       </a:pPr>
                       <a:r>
-                        <a:rPr lang="es-AR" sz="1100">
+                        <a:rPr lang="es-AR" sz="1100" dirty="0">
                           <a:solidFill>
                             <a:srgbClr val="000000"/>
                           </a:solidFill>
@@ -9732,7 +9679,7 @@
                         </a:rPr>
                         <a:t>Genera una salida por pantallas del resultado de una corrida</a:t>
                       </a:r>
-                      <a:endParaRPr lang="es-AR" sz="1100">
+                      <a:endParaRPr lang="es-AR" sz="1100" dirty="0">
                         <a:solidFill>
                           <a:srgbClr val="000000"/>
                         </a:solidFill>
@@ -9797,17 +9744,6 @@
                         </a:spcAft>
                       </a:pPr>
                       <a:r>
-                        <a:rPr lang="es-AR" sz="1100" dirty="0" err="1">
-                          <a:solidFill>
-                            <a:srgbClr val="000000"/>
-                          </a:solidFill>
-                          <a:latin typeface="Arial"/>
-                          <a:ea typeface="Liberation Sans"/>
-                          <a:cs typeface="Times New Roman"/>
-                        </a:rPr>
-                        <a:t>ordenarEventos</a:t>
-                      </a:r>
-                      <a:r>
                         <a:rPr lang="es-AR" sz="1100" dirty="0">
                           <a:solidFill>
                             <a:srgbClr val="000000"/>
@@ -9816,7 +9752,7 @@
                           <a:ea typeface="Liberation Sans"/>
                           <a:cs typeface="Times New Roman"/>
                         </a:rPr>
-                        <a:t>()</a:t>
+                        <a:t>ordenarEventos()</a:t>
                       </a:r>
                       <a:endParaRPr lang="es-AR" sz="1100" dirty="0">
                         <a:solidFill>
@@ -9951,29 +9887,7 @@
                           <a:ea typeface="Liberation Sans"/>
                           <a:cs typeface="Times New Roman"/>
                         </a:rPr>
-                        <a:t>Asegura que el </a:t>
-                      </a:r>
-                      <a:r>
-                        <a:rPr lang="es-AR" sz="1100" dirty="0" err="1">
-                          <a:solidFill>
-                            <a:srgbClr val="000000"/>
-                          </a:solidFill>
-                          <a:latin typeface="Arial"/>
-                          <a:ea typeface="Liberation Sans"/>
-                          <a:cs typeface="Times New Roman"/>
-                        </a:rPr>
-                        <a:t>ArrayList</a:t>
-                      </a:r>
-                      <a:r>
-                        <a:rPr lang="es-AR" sz="1100" dirty="0">
-                          <a:solidFill>
-                            <a:srgbClr val="000000"/>
-                          </a:solidFill>
-                          <a:latin typeface="Arial"/>
-                          <a:ea typeface="Liberation Sans"/>
-                          <a:cs typeface="Times New Roman"/>
-                        </a:rPr>
-                        <a:t> de eventos se mantenga ordenado de manera ascendente. </a:t>
+                        <a:t>Asegura que el ArrayList de eventos se mantenga ordenado de manera ascendente. </a:t>
                       </a:r>
                       <a:endParaRPr lang="es-AR" sz="1100" dirty="0">
                         <a:solidFill>
@@ -10756,15 +10670,7 @@
                   <a:schemeClr val="tx1"/>
                 </a:solidFill>
               </a:rPr>
-              <a:t>	</a:t>
-            </a:r>
-            <a:r>
-              <a:rPr lang="es-AR" sz="1800" dirty="0" smtClean="0">
-                <a:solidFill>
-                  <a:schemeClr val="tx1"/>
-                </a:solidFill>
-              </a:rPr>
-              <a:t>- se incrementa la cantidad de enlaces.</a:t>
+              <a:t>	- se incrementa la cantidad de enlaces.</a:t>
             </a:r>
           </a:p>
           <a:p>
@@ -10780,15 +10686,7 @@
                   <a:schemeClr val="tx1"/>
                 </a:solidFill>
               </a:rPr>
-              <a:t>	</a:t>
-            </a:r>
-            <a:r>
-              <a:rPr lang="es-AR" sz="1800" dirty="0" smtClean="0">
-                <a:solidFill>
-                  <a:schemeClr val="tx1"/>
-                </a:solidFill>
-              </a:rPr>
-              <a:t>- se incrementa la cantidad de llamadas.</a:t>
+              <a:t>	- se incrementa la cantidad de llamadas.</a:t>
             </a:r>
           </a:p>
           <a:p>
@@ -10808,11 +10706,6 @@
               </a:rPr>
               <a:t>La velocidad de crecimiento de la proporción de exitosas por variación de la cantidad de enlaces es:</a:t>
             </a:r>
-            <a:endParaRPr lang="es-AR" sz="1800" dirty="0" smtClean="0">
-              <a:solidFill>
-                <a:schemeClr val="tx1"/>
-              </a:solidFill>
-            </a:endParaRPr>
           </a:p>
           <a:p>
             <a:pPr marL="457200" lvl="0" indent="-342900" rtl="0">
@@ -10851,15 +10744,7 @@
                   <a:schemeClr val="tx1"/>
                 </a:solidFill>
               </a:rPr>
-              <a:t>	</a:t>
-            </a:r>
-            <a:r>
-              <a:rPr lang="es-AR" sz="1800" dirty="0" smtClean="0">
-                <a:solidFill>
-                  <a:schemeClr val="tx1"/>
-                </a:solidFill>
-              </a:rPr>
-              <a:t>- Alta: A partir de los 15 teléfonos aprox.</a:t>
+              <a:t>	- Alta: A partir de los 15 teléfonos aprox.</a:t>
             </a:r>
           </a:p>
           <a:p>
@@ -10893,15 +10778,7 @@
                   <a:schemeClr val="tx1"/>
                 </a:solidFill>
               </a:rPr>
-              <a:t>	</a:t>
-            </a:r>
-            <a:r>
-              <a:rPr lang="es-AR" sz="1800" dirty="0" smtClean="0">
-                <a:solidFill>
-                  <a:schemeClr val="tx1"/>
-                </a:solidFill>
-              </a:rPr>
-              <a:t>- Baja (casi constante): para cantidad de enlaces entre 1 y 3</a:t>
+              <a:t>	- Baja (casi constante): para cantidad de enlaces entre 1 y 3</a:t>
             </a:r>
           </a:p>
           <a:p>
@@ -10917,15 +10794,7 @@
                   <a:schemeClr val="tx1"/>
                 </a:solidFill>
               </a:rPr>
-              <a:t>	</a:t>
-            </a:r>
-            <a:r>
-              <a:rPr lang="es-AR" sz="1800" dirty="0" smtClean="0">
-                <a:solidFill>
-                  <a:schemeClr val="tx1"/>
-                </a:solidFill>
-              </a:rPr>
-              <a:t>- Alta: A partir de los 4 enlaces aprox.</a:t>
+              <a:t>	- Alta: A partir de los 4 enlaces aprox.</a:t>
             </a:r>
           </a:p>
           <a:p>
@@ -11086,7 +10955,7 @@
               <a:buSzPct val="166666"/>
             </a:pPr>
             <a:r>
-              <a:rPr lang="es-AR" sz="1800" dirty="0" err="1" smtClean="0">
+              <a:rPr lang="es-AR" sz="1800" dirty="0" smtClean="0">
                 <a:solidFill>
                   <a:schemeClr val="tx1"/>
                 </a:solidFill>
@@ -11101,11 +10970,6 @@
               </a:rPr>
               <a:t>. Tel.     [5, 15]                                                            [16, 100]</a:t>
             </a:r>
-            <a:endParaRPr lang="es-AR" sz="1800" dirty="0" smtClean="0">
-              <a:solidFill>
-                <a:schemeClr val="tx1"/>
-              </a:solidFill>
-            </a:endParaRPr>
           </a:p>
           <a:p>
             <a:pPr marL="457200" lvl="0" indent="-342900" rtl="0">
@@ -11122,11 +10986,6 @@
               </a:rPr>
               <a:t>	</a:t>
             </a:r>
-            <a:endParaRPr lang="es-AR" sz="1800" dirty="0" smtClean="0">
-              <a:solidFill>
-                <a:schemeClr val="tx1"/>
-              </a:solidFill>
-            </a:endParaRPr>
           </a:p>
         </p:txBody>
       </p:sp>
@@ -11303,7 +11162,7 @@
               <a:buSzPct val="166666"/>
             </a:pPr>
             <a:r>
-              <a:rPr lang="es-AR" sz="1800" dirty="0" err="1" smtClean="0">
+              <a:rPr lang="es-AR" sz="1800" dirty="0" smtClean="0">
                 <a:solidFill>
                   <a:schemeClr val="tx1"/>
                 </a:solidFill>
@@ -11319,7 +11178,7 @@
               <a:t>. </a:t>
             </a:r>
             <a:r>
-              <a:rPr lang="es-AR" sz="1800" dirty="0" err="1" smtClean="0">
+              <a:rPr lang="es-AR" sz="1800" dirty="0" smtClean="0">
                 <a:solidFill>
                   <a:schemeClr val="tx1"/>
                 </a:solidFill>
@@ -11334,11 +11193,6 @@
               </a:rPr>
               <a:t>.     [1, 3]                                                               [4, 10]</a:t>
             </a:r>
-            <a:endParaRPr lang="es-AR" sz="1800" dirty="0" smtClean="0">
-              <a:solidFill>
-                <a:schemeClr val="tx1"/>
-              </a:solidFill>
-            </a:endParaRPr>
           </a:p>
           <a:p>
             <a:pPr marL="457200" lvl="0" indent="-342900" rtl="0">
@@ -11355,11 +11209,6 @@
               </a:rPr>
               <a:t>	</a:t>
             </a:r>
-            <a:endParaRPr lang="es-AR" sz="1800" dirty="0" smtClean="0">
-              <a:solidFill>
-                <a:schemeClr val="tx1"/>
-              </a:solidFill>
-            </a:endParaRPr>
           </a:p>
         </p:txBody>
       </p:sp>
@@ -11530,7 +11379,7 @@
               <a:t>A partir de una cantidad de 25 teléfonos </a:t>
             </a:r>
             <a:r>
-              <a:rPr lang="es-AR" sz="1800" dirty="0" err="1" smtClean="0">
+              <a:rPr lang="es-AR" sz="1800" dirty="0" smtClean="0">
                 <a:solidFill>
                   <a:schemeClr val="tx1"/>
                 </a:solidFill>
@@ -11689,11 +11538,6 @@
               </a:rPr>
               <a:t>Al crecer la cantidad de enlaces, el sistema permite el establecimiento de mayor cantidad de llamadas de manera simultanea.</a:t>
             </a:r>
-            <a:endParaRPr lang="es-AR" sz="1800" dirty="0" smtClean="0">
-              <a:solidFill>
-                <a:schemeClr val="tx1"/>
-              </a:solidFill>
-            </a:endParaRPr>
           </a:p>
         </p:txBody>
       </p:sp>
@@ -11797,15 +11641,7 @@
                     <a:srgbClr val="434343"/>
                   </a:solidFill>
                 </a:rPr>
-                <a:t>Notificación</a:t>
-              </a:r>
-              <a:r>
-                <a:rPr lang="es-AR" sz="1200" b="1" dirty="0" smtClean="0">
-                  <a:solidFill>
-                    <a:srgbClr val="434343"/>
-                  </a:solidFill>
-                </a:rPr>
-                <a:t> detención</a:t>
+                <a:t>Notificación detención</a:t>
               </a:r>
               <a:endParaRPr lang="x-none" sz="1200" b="1" i="1">
                 <a:solidFill>
@@ -11850,7 +11686,7 @@
           </a:bodyPr>
           <a:lstStyle/>
           <a:p>
-            <a:endParaRPr lang="es-AR"/>
+            <a:endParaRPr lang="es-AR" dirty="0"/>
           </a:p>
         </p:txBody>
       </p:sp>
@@ -11941,7 +11777,7 @@
               <a:buNone/>
               <a:tabLst/>
             </a:pPr>
-            <a:endParaRPr kumimoji="0" lang="es-AR" sz="1800" b="0" i="0" u="none" strike="noStrike" cap="none" normalizeH="0" baseline="0" smtClean="0">
+            <a:endParaRPr kumimoji="0" lang="es-AR" sz="1800" b="0" i="0" u="none" strike="noStrike" cap="none" normalizeH="0" baseline="0" dirty="0" smtClean="0">
               <a:ln>
                 <a:noFill/>
               </a:ln>
@@ -12065,11 +11901,6 @@
               </a:rPr>
               <a:t>Umbral de enlaces válidos para una cantidad de teléfonos par</a:t>
             </a:r>
-            <a:endParaRPr lang="es-AR" sz="1800" b="1" dirty="0" smtClean="0">
-              <a:solidFill>
-                <a:schemeClr val="accent3"/>
-              </a:solidFill>
-            </a:endParaRPr>
           </a:p>
         </p:txBody>
       </p:sp>
@@ -12129,7 +11960,7 @@
           </a:bodyPr>
           <a:lstStyle/>
           <a:p>
-            <a:endParaRPr lang="es-AR"/>
+            <a:endParaRPr lang="es-AR" dirty="0"/>
           </a:p>
         </p:txBody>
       </p:sp>
@@ -12183,7 +12014,7 @@
               <a:buNone/>
               <a:tabLst/>
             </a:pPr>
-            <a:endParaRPr kumimoji="0" lang="es-AR" sz="1800" b="0" i="0" u="none" strike="noStrike" cap="none" normalizeH="0" baseline="0" smtClean="0">
+            <a:endParaRPr kumimoji="0" lang="es-AR" sz="1800" b="0" i="0" u="none" strike="noStrike" cap="none" normalizeH="0" baseline="0" dirty="0" smtClean="0">
               <a:ln>
                 <a:noFill/>
               </a:ln>
@@ -12547,11 +12378,6 @@
               </a:rPr>
               <a:t>Umbral de enlaces válidos para una cantidad de teléfonos par</a:t>
             </a:r>
-            <a:endParaRPr lang="es-AR" sz="1800" b="1" dirty="0" smtClean="0">
-              <a:solidFill>
-                <a:schemeClr val="accent3"/>
-              </a:solidFill>
-            </a:endParaRPr>
           </a:p>
         </p:txBody>
       </p:sp>
@@ -12611,7 +12437,7 @@
           </a:bodyPr>
           <a:lstStyle/>
           <a:p>
-            <a:endParaRPr lang="es-AR"/>
+            <a:endParaRPr lang="es-AR" dirty="0"/>
           </a:p>
         </p:txBody>
       </p:sp>
@@ -12665,7 +12491,7 @@
               <a:buNone/>
               <a:tabLst/>
             </a:pPr>
-            <a:endParaRPr kumimoji="0" lang="es-AR" sz="1800" b="0" i="0" u="none" strike="noStrike" cap="none" normalizeH="0" baseline="0" smtClean="0">
+            <a:endParaRPr kumimoji="0" lang="es-AR" sz="1800" b="0" i="0" u="none" strike="noStrike" cap="none" normalizeH="0" baseline="0" dirty="0" smtClean="0">
               <a:ln>
                 <a:noFill/>
               </a:ln>
@@ -13179,7 +13005,7 @@
           </a:bodyPr>
           <a:lstStyle/>
           <a:p>
-            <a:endParaRPr lang="es-AR"/>
+            <a:endParaRPr lang="es-AR" dirty="0"/>
           </a:p>
         </p:txBody>
       </p:sp>
@@ -13270,7 +13096,7 @@
               <a:buNone/>
               <a:tabLst/>
             </a:pPr>
-            <a:endParaRPr kumimoji="0" lang="es-AR" sz="1800" b="0" i="0" u="none" strike="noStrike" cap="none" normalizeH="0" baseline="0" smtClean="0">
+            <a:endParaRPr kumimoji="0" lang="es-AR" sz="1800" b="0" i="0" u="none" strike="noStrike" cap="none" normalizeH="0" baseline="0" dirty="0" smtClean="0">
               <a:ln>
                 <a:noFill/>
               </a:ln>
@@ -13453,7 +13279,7 @@
           </a:bodyPr>
           <a:lstStyle/>
           <a:p>
-            <a:endParaRPr lang="es-AR"/>
+            <a:endParaRPr lang="es-AR" dirty="0"/>
           </a:p>
         </p:txBody>
       </p:sp>
@@ -13507,7 +13333,7 @@
               <a:buNone/>
               <a:tabLst/>
             </a:pPr>
-            <a:endParaRPr kumimoji="0" lang="es-AR" sz="1800" b="0" i="0" u="none" strike="noStrike" cap="none" normalizeH="0" baseline="0" smtClean="0">
+            <a:endParaRPr kumimoji="0" lang="es-AR" sz="1800" b="0" i="0" u="none" strike="noStrike" cap="none" normalizeH="0" baseline="0" dirty="0" smtClean="0">
               <a:ln>
                 <a:noFill/>
               </a:ln>
@@ -13720,7 +13546,7 @@
           </a:bodyPr>
           <a:lstStyle/>
           <a:p>
-            <a:endParaRPr lang="es-AR"/>
+            <a:endParaRPr lang="es-AR" dirty="0"/>
           </a:p>
         </p:txBody>
       </p:sp>
@@ -13774,7 +13600,7 @@
               <a:buNone/>
               <a:tabLst/>
             </a:pPr>
-            <a:endParaRPr kumimoji="0" lang="es-AR" sz="1800" b="0" i="0" u="none" strike="noStrike" cap="none" normalizeH="0" baseline="0" smtClean="0">
+            <a:endParaRPr kumimoji="0" lang="es-AR" sz="1800" b="0" i="0" u="none" strike="noStrike" cap="none" normalizeH="0" baseline="0" dirty="0" smtClean="0">
               <a:ln>
                 <a:noFill/>
               </a:ln>
@@ -13992,29 +13818,8 @@
                   <a:schemeClr val="tx1"/>
                 </a:solidFill>
               </a:rPr>
-              <a:t>Tiempo espera máximo: 2hr 11min (para 99 </a:t>
+              <a:t>Tiempo espera máximo: 2hr 11min (para 99 teléfonos y 1 enlace)</a:t>
             </a:r>
-            <a:r>
-              <a:rPr lang="es-AR" sz="1800" dirty="0" smtClean="0">
-                <a:solidFill>
-                  <a:schemeClr val="tx1"/>
-                </a:solidFill>
-              </a:rPr>
-              <a:t>teléfonos y </a:t>
-            </a:r>
-            <a:r>
-              <a:rPr lang="es-AR" sz="1800" dirty="0" smtClean="0">
-                <a:solidFill>
-                  <a:schemeClr val="tx1"/>
-                </a:solidFill>
-              </a:rPr>
-              <a:t>1 enlace)</a:t>
-            </a:r>
-            <a:endParaRPr lang="es-AR" sz="1800" dirty="0" smtClean="0">
-              <a:solidFill>
-                <a:schemeClr val="tx1"/>
-              </a:solidFill>
-            </a:endParaRPr>
           </a:p>
           <a:p>
             <a:pPr marL="457200" lvl="0" indent="-342900">
@@ -14030,11 +13835,6 @@
               </a:rPr>
               <a:t>Tiempo espera mínimo: 0 (para cualquier combinación entre cantidad de teléfonos baja y cantidad de enlaces alta).</a:t>
             </a:r>
-            <a:endParaRPr lang="es-AR" sz="1800" dirty="0" smtClean="0">
-              <a:solidFill>
-                <a:schemeClr val="tx1"/>
-              </a:solidFill>
-            </a:endParaRPr>
           </a:p>
           <a:p>
             <a:pPr marL="457200" lvl="0" indent="-342900" rtl="0">
@@ -14152,7 +13952,7 @@
           </a:bodyPr>
           <a:lstStyle/>
           <a:p>
-            <a:endParaRPr lang="es-AR"/>
+            <a:endParaRPr lang="es-AR" dirty="0"/>
           </a:p>
         </p:txBody>
       </p:sp>
@@ -14206,7 +14006,7 @@
               <a:buNone/>
               <a:tabLst/>
             </a:pPr>
-            <a:endParaRPr kumimoji="0" lang="es-AR" sz="1800" b="0" i="0" u="none" strike="noStrike" cap="none" normalizeH="0" baseline="0" smtClean="0">
+            <a:endParaRPr kumimoji="0" lang="es-AR" sz="1800" b="0" i="0" u="none" strike="noStrike" cap="none" normalizeH="0" baseline="0" dirty="0" smtClean="0">
               <a:ln>
                 <a:noFill/>
               </a:ln>
@@ -14529,7 +14329,7 @@
           </a:bodyPr>
           <a:lstStyle/>
           <a:p>
-            <a:endParaRPr lang="es-AR"/>
+            <a:endParaRPr lang="es-AR" dirty="0"/>
           </a:p>
         </p:txBody>
       </p:sp>
@@ -14583,7 +14383,7 @@
               <a:buNone/>
               <a:tabLst/>
             </a:pPr>
-            <a:endParaRPr kumimoji="0" lang="es-AR" sz="1800" b="0" i="0" u="none" strike="noStrike" cap="none" normalizeH="0" baseline="0" smtClean="0">
+            <a:endParaRPr kumimoji="0" lang="es-AR" sz="1800" b="0" i="0" u="none" strike="noStrike" cap="none" normalizeH="0" baseline="0" dirty="0" smtClean="0">
               <a:ln>
                 <a:noFill/>
               </a:ln>
@@ -14770,12 +14570,12 @@
               <a:t>Al incorporar cola FIFO incrementa en un 5% la </a:t>
             </a:r>
             <a:r>
-              <a:rPr lang="es-AR" sz="1800" dirty="0" err="1" smtClean="0">
+              <a:rPr lang="es-AR" sz="1800" dirty="0" smtClean="0">
                 <a:solidFill>
                   <a:schemeClr val="tx1"/>
                 </a:solidFill>
               </a:rPr>
-              <a:t>proporcion</a:t>
+              <a:t>proporción </a:t>
             </a:r>
             <a:r>
               <a:rPr lang="es-AR" sz="1800" dirty="0" smtClean="0">
@@ -14783,7 +14583,7 @@
                   <a:schemeClr val="tx1"/>
                 </a:solidFill>
               </a:rPr>
-              <a:t> de llamadas exitosas.</a:t>
+              <a:t>de llamadas exitosas.</a:t>
             </a:r>
           </a:p>
           <a:p>
@@ -14803,11 +14603,6 @@
               </a:rPr>
               <a:t>A medida que disminuye la cantidad de teléfonos =&gt; disminuye proporción de exitosas y tiempo promedio de espera. Razón: al haber menos teléfonos en el sistema, se producen mas casos de llamadas ocupadas.</a:t>
             </a:r>
-            <a:endParaRPr lang="es-AR" sz="1800" dirty="0" smtClean="0">
-              <a:solidFill>
-                <a:schemeClr val="tx1"/>
-              </a:solidFill>
-            </a:endParaRPr>
           </a:p>
           <a:p>
             <a:pPr marL="457200" lvl="0" indent="-342900" rtl="0">
@@ -15008,11 +14803,6 @@
               </a:rPr>
               <a:t>Justificación:</a:t>
             </a:r>
-            <a:endParaRPr lang="es-AR" sz="1800" b="1" dirty="0" smtClean="0">
-              <a:solidFill>
-                <a:schemeClr val="tx1"/>
-              </a:solidFill>
-            </a:endParaRPr>
           </a:p>
           <a:p>
             <a:pPr marL="457200" lvl="0" indent="-342900" rtl="0">
@@ -15029,15 +14819,7 @@
                   <a:schemeClr val="tx1"/>
                 </a:solidFill>
               </a:rPr>
-              <a:t>L</a:t>
-            </a:r>
-            <a:r>
-              <a:rPr lang="es-AR" sz="1800" dirty="0" smtClean="0">
-                <a:solidFill>
-                  <a:schemeClr val="tx1"/>
-                </a:solidFill>
-              </a:rPr>
-              <a:t>a proporción de exitosas crece al aumentar la cantidad de enlaces, y</a:t>
+              <a:t>La proporción de exitosas crece al aumentar la cantidad de enlaces, y</a:t>
             </a:r>
           </a:p>
           <a:p>
@@ -15522,17 +15304,7 @@
                   </a:schemeClr>
                 </a:solidFill>
               </a:rPr>
-              <a:t>L</a:t>
-            </a:r>
-            <a:r>
-              <a:rPr lang="es-AR" sz="1800" b="1" dirty="0" smtClean="0">
-                <a:solidFill>
-                  <a:schemeClr val="tx2">
-                    <a:lumMod val="50000"/>
-                  </a:schemeClr>
-                </a:solidFill>
-              </a:rPr>
-              <a:t>a proporción de llamadas que el sistema procesa con éxito.</a:t>
+              <a:t>La proporción de llamadas que el sistema procesa con éxito.</a:t>
             </a:r>
           </a:p>
           <a:p>
@@ -15550,13 +15322,6 @@
               </a:rPr>
               <a:t>El tiempo medio de espera por falta de enlace.</a:t>
             </a:r>
-            <a:endParaRPr lang="es-AR" sz="1800" b="1" dirty="0" smtClean="0">
-              <a:solidFill>
-                <a:schemeClr val="tx2">
-                  <a:lumMod val="50000"/>
-                </a:schemeClr>
-              </a:solidFill>
-            </a:endParaRPr>
           </a:p>
           <a:p>
             <a:endParaRPr lang="es-AR" sz="1800" dirty="0"/>
@@ -15566,7 +15331,7 @@
     </p:spTree>
     <p:extLst>
       <p:ext uri="{BB962C8B-B14F-4D97-AF65-F5344CB8AC3E}">
-        <p14:creationId xmlns="" xmlns:p14="http://schemas.microsoft.com/office/powerpoint/2010/main" val="2496261218"/>
+        <p14:creationId xmlns:p14="http://schemas.microsoft.com/office/powerpoint/2010/main" xmlns="" val="2496261218"/>
       </p:ext>
     </p:extLst>
   </p:cSld>
@@ -15633,7 +15398,7 @@
           </a:bodyPr>
           <a:lstStyle/>
           <a:p>
-            <a:endParaRPr/>
+            <a:endParaRPr dirty="0"/>
           </a:p>
         </p:txBody>
       </p:sp>
@@ -15841,11 +15606,7 @@
             </a:r>
             <a:r>
               <a:rPr lang="es-AR" sz="1800" dirty="0" smtClean="0"/>
-              <a:t> = </a:t>
-            </a:r>
-            <a:r>
-              <a:rPr lang="es-AR" sz="1800" dirty="0" smtClean="0"/>
-              <a:t>180 segundos</a:t>
+              <a:t> = 180 segundos</a:t>
             </a:r>
           </a:p>
           <a:p>
@@ -15895,35 +15656,8 @@
                   </a:schemeClr>
                 </a:solidFill>
               </a:rPr>
-              <a:t>“El </a:t>
+              <a:t>“El propósito de la simulación será procesar un número dado de llamadas y determinar la proporción de exitosas y de no exitosas”</a:t>
             </a:r>
-            <a:r>
-              <a:rPr lang="es-AR" sz="1800" b="1" dirty="0" smtClean="0">
-                <a:solidFill>
-                  <a:schemeClr val="tx2">
-                    <a:lumMod val="50000"/>
-                  </a:schemeClr>
-                </a:solidFill>
-              </a:rPr>
-              <a:t>propósito de la simulación será procesar un número dado de llamadas y determinar la proporción de exitosas y de no </a:t>
-            </a:r>
-            <a:r>
-              <a:rPr lang="es-AR" sz="1800" b="1" dirty="0" smtClean="0">
-                <a:solidFill>
-                  <a:schemeClr val="tx2">
-                    <a:lumMod val="50000"/>
-                  </a:schemeClr>
-                </a:solidFill>
-              </a:rPr>
-              <a:t>exitosas”</a:t>
-            </a:r>
-            <a:endParaRPr lang="es-AR" sz="1800" b="1" dirty="0" smtClean="0">
-              <a:solidFill>
-                <a:schemeClr val="tx2">
-                  <a:lumMod val="50000"/>
-                </a:schemeClr>
-              </a:solidFill>
-            </a:endParaRPr>
           </a:p>
           <a:p>
             <a:pPr>
@@ -15960,7 +15694,7 @@
           </a:bodyPr>
           <a:lstStyle/>
           <a:p>
-            <a:endParaRPr lang="es-AR"/>
+            <a:endParaRPr lang="es-AR" dirty="0"/>
           </a:p>
         </p:txBody>
       </p:sp>
@@ -15990,7 +15724,7 @@
           </a:bodyPr>
           <a:lstStyle/>
           <a:p>
-            <a:endParaRPr lang="es-AR"/>
+            <a:endParaRPr lang="es-AR" dirty="0"/>
           </a:p>
         </p:txBody>
       </p:sp>
@@ -16023,7 +15757,7 @@
     </p:spTree>
     <p:extLst>
       <p:ext uri="{BB962C8B-B14F-4D97-AF65-F5344CB8AC3E}">
-        <p14:creationId xmlns="" xmlns:p14="http://schemas.microsoft.com/office/powerpoint/2010/main" val="580701930"/>
+        <p14:creationId xmlns:p14="http://schemas.microsoft.com/office/powerpoint/2010/main" xmlns="" val="580701930"/>
       </p:ext>
     </p:extLst>
   </p:cSld>
@@ -16125,7 +15859,7 @@
         </p:nvGraphicFramePr>
         <p:xfrm>
           <a:off x="1142976" y="1714494"/>
-          <a:ext cx="6286544" cy="3277362"/>
+          <a:ext cx="6286544" cy="3162681"/>
         </p:xfrm>
         <a:graphic>
           <a:graphicData uri="http://schemas.openxmlformats.org/drawingml/2006/table">
@@ -16226,7 +15960,7 @@
                         </a:spcAft>
                       </a:pPr>
                       <a:r>
-                        <a:rPr lang="es-AR" sz="1100" b="1">
+                        <a:rPr lang="es-AR" sz="1100" b="1" dirty="0">
                           <a:solidFill>
                             <a:srgbClr val="000000"/>
                           </a:solidFill>
@@ -16236,7 +15970,7 @@
                         </a:rPr>
                         <a:t>Descripción</a:t>
                       </a:r>
-                      <a:endParaRPr lang="es-AR" sz="1100">
+                      <a:endParaRPr lang="es-AR" sz="1100" dirty="0">
                         <a:solidFill>
                           <a:srgbClr val="000000"/>
                         </a:solidFill>
@@ -16304,7 +16038,7 @@
                         </a:spcAft>
                       </a:pPr>
                       <a:r>
-                        <a:rPr lang="es-AR" sz="1100">
+                        <a:rPr lang="es-AR" sz="1100" dirty="0">
                           <a:solidFill>
                             <a:srgbClr val="000000"/>
                           </a:solidFill>
@@ -16314,7 +16048,7 @@
                         </a:rPr>
                         <a:t>Estado</a:t>
                       </a:r>
-                      <a:endParaRPr lang="es-AR" sz="1100">
+                      <a:endParaRPr lang="es-AR" sz="1100" dirty="0">
                         <a:solidFill>
                           <a:srgbClr val="000000"/>
                         </a:solidFill>
@@ -16566,7 +16300,7 @@
                         </a:spcAft>
                       </a:pPr>
                       <a:r>
-                        <a:rPr lang="es-AR" sz="1100">
+                        <a:rPr lang="es-AR" sz="1100" dirty="0">
                           <a:solidFill>
                             <a:srgbClr val="000000"/>
                           </a:solidFill>
@@ -16576,7 +16310,7 @@
                         </a:rPr>
                         <a:t>Entidades</a:t>
                       </a:r>
-                      <a:endParaRPr lang="es-AR" sz="1100">
+                      <a:endParaRPr lang="es-AR" sz="1100" dirty="0">
                         <a:solidFill>
                           <a:srgbClr val="000000"/>
                         </a:solidFill>
@@ -16641,7 +16375,7 @@
                         <a:buChar char="-"/>
                       </a:pPr>
                       <a:r>
-                        <a:rPr lang="es-AR" sz="1100">
+                        <a:rPr lang="es-AR" sz="1100" dirty="0">
                           <a:solidFill>
                             <a:srgbClr val="000000"/>
                           </a:solidFill>
@@ -16664,7 +16398,7 @@
                         <a:buChar char="-"/>
                       </a:pPr>
                       <a:r>
-                        <a:rPr lang="es-AR" sz="1100">
+                        <a:rPr lang="es-AR" sz="1100" dirty="0">
                           <a:solidFill>
                             <a:srgbClr val="000000"/>
                           </a:solidFill>
@@ -16731,7 +16465,7 @@
                         </a:spcAft>
                       </a:pPr>
                       <a:r>
-                        <a:rPr lang="es-AR" sz="1100">
+                        <a:rPr lang="es-AR" sz="1100" dirty="0">
                           <a:solidFill>
                             <a:srgbClr val="000000"/>
                           </a:solidFill>
@@ -16741,7 +16475,7 @@
                         </a:rPr>
                         <a:t>Atributos</a:t>
                       </a:r>
-                      <a:endParaRPr lang="es-AR" sz="1100">
+                      <a:endParaRPr lang="es-AR" sz="1100" dirty="0">
                         <a:solidFill>
                           <a:srgbClr val="000000"/>
                         </a:solidFill>
@@ -16804,7 +16538,7 @@
                         </a:spcAft>
                       </a:pPr>
                       <a:r>
-                        <a:rPr lang="es-AR" sz="1100">
+                        <a:rPr lang="es-AR" sz="1100" dirty="0">
                           <a:solidFill>
                             <a:srgbClr val="000000"/>
                           </a:solidFill>
@@ -16814,7 +16548,7 @@
                         </a:rPr>
                         <a:t>Ninguna de las entidades tiene atributos distintivos que los caractericen,  como prioridad alta, media o baja para los enlaces, por ejemplo. </a:t>
                       </a:r>
-                      <a:endParaRPr lang="es-AR" sz="1100">
+                      <a:endParaRPr lang="es-AR" sz="1100" dirty="0">
                         <a:solidFill>
                           <a:srgbClr val="000000"/>
                         </a:solidFill>
@@ -16879,7 +16613,7 @@
                         </a:spcAft>
                       </a:pPr>
                       <a:r>
-                        <a:rPr lang="es-AR" sz="1100">
+                        <a:rPr lang="es-AR" sz="1100" dirty="0">
                           <a:solidFill>
                             <a:srgbClr val="000000"/>
                           </a:solidFill>
@@ -16889,7 +16623,7 @@
                         </a:rPr>
                         <a:t>Eventos</a:t>
                       </a:r>
-                      <a:endParaRPr lang="es-AR" sz="1100">
+                      <a:endParaRPr lang="es-AR" sz="1100" dirty="0">
                         <a:solidFill>
                           <a:srgbClr val="000000"/>
                         </a:solidFill>
@@ -16954,7 +16688,7 @@
                         <a:buChar char="-"/>
                       </a:pPr>
                       <a:r>
-                        <a:rPr lang="es-AR" sz="1100">
+                        <a:rPr lang="es-AR" sz="1100" dirty="0">
                           <a:solidFill>
                             <a:srgbClr val="000000"/>
                           </a:solidFill>
@@ -16977,7 +16711,7 @@
                         <a:buChar char="-"/>
                       </a:pPr>
                       <a:r>
-                        <a:rPr lang="es-AR" sz="1100">
+                        <a:rPr lang="es-AR" sz="1100" dirty="0">
                           <a:solidFill>
                             <a:srgbClr val="000000"/>
                           </a:solidFill>
@@ -17044,7 +16778,7 @@
                         </a:spcAft>
                       </a:pPr>
                       <a:r>
-                        <a:rPr lang="es-AR" sz="1100">
+                        <a:rPr lang="es-AR" sz="1100" dirty="0">
                           <a:solidFill>
                             <a:srgbClr val="000000"/>
                           </a:solidFill>
@@ -17054,7 +16788,7 @@
                         </a:rPr>
                         <a:t>Actividades</a:t>
                       </a:r>
-                      <a:endParaRPr lang="es-AR" sz="1100">
+                      <a:endParaRPr lang="es-AR" sz="1100" dirty="0">
                         <a:solidFill>
                           <a:srgbClr val="000000"/>
                         </a:solidFill>
@@ -17119,7 +16853,7 @@
                         <a:buChar char="-"/>
                       </a:pPr>
                       <a:r>
-                        <a:rPr lang="es-AR" sz="1100">
+                        <a:rPr lang="es-AR" sz="1100" dirty="0">
                           <a:solidFill>
                             <a:srgbClr val="000000"/>
                           </a:solidFill>
@@ -17142,7 +16876,7 @@
                         <a:buChar char="-"/>
                       </a:pPr>
                       <a:r>
-                        <a:rPr lang="es-AR" sz="1100">
+                        <a:rPr lang="es-AR" sz="1100" dirty="0">
                           <a:solidFill>
                             <a:srgbClr val="000000"/>
                           </a:solidFill>
@@ -17209,7 +16943,7 @@
                         </a:spcAft>
                       </a:pPr>
                       <a:r>
-                        <a:rPr lang="es-AR" sz="1100">
+                        <a:rPr lang="es-AR" sz="1100" dirty="0">
                           <a:solidFill>
                             <a:srgbClr val="000000"/>
                           </a:solidFill>
@@ -17219,7 +16953,7 @@
                         </a:rPr>
                         <a:t>Conjuntos</a:t>
                       </a:r>
-                      <a:endParaRPr lang="es-AR" sz="1100">
+                      <a:endParaRPr lang="es-AR" sz="1100" dirty="0">
                         <a:solidFill>
                           <a:srgbClr val="000000"/>
                         </a:solidFill>
@@ -17343,7 +17077,7 @@
     </p:spTree>
     <p:extLst>
       <p:ext uri="{BB962C8B-B14F-4D97-AF65-F5344CB8AC3E}">
-        <p14:creationId xmlns="" xmlns:p14="http://schemas.microsoft.com/office/powerpoint/2010/main" val="580701930"/>
+        <p14:creationId xmlns:p14="http://schemas.microsoft.com/office/powerpoint/2010/main" xmlns="" val="580701930"/>
       </p:ext>
     </p:extLst>
   </p:cSld>
@@ -17452,7 +17186,7 @@
     </p:spTree>
     <p:extLst>
       <p:ext uri="{BB962C8B-B14F-4D97-AF65-F5344CB8AC3E}">
-        <p14:creationId xmlns="" xmlns:p14="http://schemas.microsoft.com/office/powerpoint/2010/main" val="580701930"/>
+        <p14:creationId xmlns:p14="http://schemas.microsoft.com/office/powerpoint/2010/main" xmlns="" val="580701930"/>
       </p:ext>
     </p:extLst>
   </p:cSld>
@@ -17532,17 +17266,7 @@
                   </a:schemeClr>
                 </a:solidFill>
               </a:rPr>
-              <a:t>Alternativas de resoluci</a:t>
-            </a:r>
-            <a:r>
-              <a:rPr lang="es-AR" sz="1800" b="1" dirty="0" smtClean="0">
-                <a:solidFill>
-                  <a:schemeClr val="tx2">
-                    <a:lumMod val="50000"/>
-                  </a:schemeClr>
-                </a:solidFill>
-              </a:rPr>
-              <a:t>ón</a:t>
+              <a:t>Alternativas de resolución</a:t>
             </a:r>
           </a:p>
           <a:p>
@@ -17604,16 +17328,10 @@
                   <a:schemeClr val="tx1"/>
                 </a:solidFill>
               </a:rPr>
-              <a:t>	</a:t>
+              <a:t>		       Solo se consideran no exitosas las llamadas ocupadas.</a:t>
             </a:r>
-            <a:r>
-              <a:rPr lang="es-AR" sz="1800" dirty="0" smtClean="0">
-                <a:solidFill>
-                  <a:schemeClr val="tx1"/>
-                </a:solidFill>
-              </a:rPr>
-              <a:t>	       Solo se consideran no exitosas las llamadas ocupadas.</a:t>
-            </a:r>
+          </a:p>
+          <a:p>
             <a:endParaRPr lang="es-AR" sz="1800" dirty="0" smtClean="0">
               <a:solidFill>
                 <a:schemeClr val="tx1"/>
@@ -17621,13 +17339,6 @@
             </a:endParaRPr>
           </a:p>
           <a:p>
-            <a:endParaRPr lang="es-AR" sz="1800" dirty="0" smtClean="0">
-              <a:solidFill>
-                <a:schemeClr val="tx1"/>
-              </a:solidFill>
-            </a:endParaRPr>
-          </a:p>
-          <a:p>
             <a:endParaRPr lang="es-AR" sz="1800" dirty="0">
               <a:solidFill>
                 <a:schemeClr val="tx1"/>
@@ -17639,7 +17350,7 @@
     </p:spTree>
     <p:extLst>
       <p:ext uri="{BB962C8B-B14F-4D97-AF65-F5344CB8AC3E}">
-        <p14:creationId xmlns="" xmlns:p14="http://schemas.microsoft.com/office/powerpoint/2010/main" val="580701930"/>
+        <p14:creationId xmlns:p14="http://schemas.microsoft.com/office/powerpoint/2010/main" xmlns="" val="580701930"/>
       </p:ext>
     </p:extLst>
   </p:cSld>

</xml_diff>